<commit_message>
Test 2 e 3
</commit_message>
<xml_diff>
--- a/Presentation.pptx
+++ b/Presentation.pptx
@@ -27,8 +27,13 @@
     <p:sldId id="259" r:id="rId21"/>
     <p:sldId id="278" r:id="rId22"/>
     <p:sldId id="272" r:id="rId23"/>
-    <p:sldId id="279" r:id="rId24"/>
-    <p:sldId id="286" r:id="rId25"/>
+    <p:sldId id="292" r:id="rId24"/>
+    <p:sldId id="295" r:id="rId25"/>
+    <p:sldId id="288" r:id="rId26"/>
+    <p:sldId id="293" r:id="rId27"/>
+    <p:sldId id="294" r:id="rId28"/>
+    <p:sldId id="291" r:id="rId29"/>
+    <p:sldId id="286" r:id="rId30"/>
   </p:sldIdLst>
   <p:sldSz cx="12192000" cy="6858000"/>
   <p:notesSz cx="6858000" cy="9144000"/>
@@ -139,6 +144,2274 @@
 <p1510:revInfo xmlns:a="http://schemas.openxmlformats.org/drawingml/2006/main" xmlns:r="http://schemas.openxmlformats.org/officeDocument/2006/relationships" xmlns:p1510="http://schemas.microsoft.com/office/powerpoint/2015/10/main"/>
 </file>
 
+<file path=ppt/charts/chart1.xml><?xml version="1.0" encoding="utf-8"?>
+<c:chartSpace xmlns:c="http://schemas.openxmlformats.org/drawingml/2006/chart" xmlns:a="http://schemas.openxmlformats.org/drawingml/2006/main" xmlns:r="http://schemas.openxmlformats.org/officeDocument/2006/relationships" xmlns:c16r2="http://schemas.microsoft.com/office/drawing/2015/06/chart">
+  <c:date1904 val="0"/>
+  <c:lang val="it-IT"/>
+  <c:roundedCorners val="0"/>
+  <mc:AlternateContent xmlns:mc="http://schemas.openxmlformats.org/markup-compatibility/2006">
+    <mc:Choice xmlns:c14="http://schemas.microsoft.com/office/drawing/2007/8/2/chart" Requires="c14">
+      <c14:style val="102"/>
+    </mc:Choice>
+    <mc:Fallback>
+      <c:style val="2"/>
+    </mc:Fallback>
+  </mc:AlternateContent>
+  <c:chart>
+    <c:title>
+      <c:tx>
+        <c:rich>
+          <a:bodyPr rot="0" spcFirstLastPara="1" vertOverflow="ellipsis" vert="horz" wrap="square" anchor="ctr" anchorCtr="1"/>
+          <a:lstStyle/>
+          <a:p>
+            <a:pPr>
+              <a:defRPr sz="2128" b="1" i="0" u="none" strike="noStrike" kern="1200" cap="none" spc="0" normalizeH="0" baseline="0">
+                <a:solidFill>
+                  <a:schemeClr val="dk1">
+                    <a:lumMod val="50000"/>
+                    <a:lumOff val="50000"/>
+                  </a:schemeClr>
+                </a:solidFill>
+                <a:latin typeface="+mj-lt"/>
+                <a:ea typeface="+mj-ea"/>
+                <a:cs typeface="+mj-cs"/>
+              </a:defRPr>
+            </a:pPr>
+            <a:r>
+              <a:rPr lang="en-US"/>
+              <a:t> Dataset Lenght (#char)</a:t>
+            </a:r>
+          </a:p>
+        </c:rich>
+      </c:tx>
+      <c:overlay val="0"/>
+      <c:spPr>
+        <a:noFill/>
+        <a:ln>
+          <a:noFill/>
+        </a:ln>
+        <a:effectLst/>
+      </c:spPr>
+      <c:txPr>
+        <a:bodyPr rot="0" spcFirstLastPara="1" vertOverflow="ellipsis" vert="horz" wrap="square" anchor="ctr" anchorCtr="1"/>
+        <a:lstStyle/>
+        <a:p>
+          <a:pPr>
+            <a:defRPr sz="2128" b="1" i="0" u="none" strike="noStrike" kern="1200" cap="none" spc="0" normalizeH="0" baseline="0">
+              <a:solidFill>
+                <a:schemeClr val="dk1">
+                  <a:lumMod val="50000"/>
+                  <a:lumOff val="50000"/>
+                </a:schemeClr>
+              </a:solidFill>
+              <a:latin typeface="+mj-lt"/>
+              <a:ea typeface="+mj-ea"/>
+              <a:cs typeface="+mj-cs"/>
+            </a:defRPr>
+          </a:pPr>
+          <a:endParaRPr lang="it-IT"/>
+        </a:p>
+      </c:txPr>
+    </c:title>
+    <c:autoTitleDeleted val="0"/>
+    <c:plotArea>
+      <c:layout/>
+      <c:lineChart>
+        <c:grouping val="standard"/>
+        <c:varyColors val="0"/>
+        <c:ser>
+          <c:idx val="0"/>
+          <c:order val="0"/>
+          <c:tx>
+            <c:v>Serial</c:v>
+          </c:tx>
+          <c:spPr>
+            <a:ln w="22225" cap="rnd">
+              <a:solidFill>
+                <a:schemeClr val="accent1"/>
+              </a:solidFill>
+              <a:round/>
+            </a:ln>
+            <a:effectLst/>
+          </c:spPr>
+          <c:marker>
+            <c:symbol val="none"/>
+          </c:marker>
+          <c:cat>
+            <c:strRef>
+              <c:f>Foglio1!$A$4:$A$8</c:f>
+              <c:strCache>
+                <c:ptCount val="5"/>
+                <c:pt idx="0">
+                  <c:v>10^3</c:v>
+                </c:pt>
+                <c:pt idx="1">
+                  <c:v>10^4</c:v>
+                </c:pt>
+                <c:pt idx="2">
+                  <c:v>10^5</c:v>
+                </c:pt>
+                <c:pt idx="3">
+                  <c:v>10^6</c:v>
+                </c:pt>
+                <c:pt idx="4">
+                  <c:v>10^7</c:v>
+                </c:pt>
+              </c:strCache>
+            </c:strRef>
+          </c:cat>
+          <c:val>
+            <c:numRef>
+              <c:f>Foglio1!$E$4:$E$8</c:f>
+              <c:numCache>
+                <c:formatCode>0.000</c:formatCode>
+                <c:ptCount val="5"/>
+                <c:pt idx="0">
+                  <c:v>1.4999999999999999E-2</c:v>
+                </c:pt>
+                <c:pt idx="1">
+                  <c:v>0.12733333333333333</c:v>
+                </c:pt>
+                <c:pt idx="2">
+                  <c:v>1.3006666666666666</c:v>
+                </c:pt>
+                <c:pt idx="3">
+                  <c:v>12.011333333333333</c:v>
+                </c:pt>
+                <c:pt idx="4">
+                  <c:v>102.23166666666667</c:v>
+                </c:pt>
+              </c:numCache>
+            </c:numRef>
+          </c:val>
+          <c:smooth val="0"/>
+          <c:extLst>
+            <c:ext xmlns:c16="http://schemas.microsoft.com/office/drawing/2014/chart" uri="{C3380CC4-5D6E-409C-BE32-E72D297353CC}">
+              <c16:uniqueId val="{00000000-8D8D-43E6-92B3-07B6705A01DD}"/>
+            </c:ext>
+          </c:extLst>
+        </c:ser>
+        <c:ser>
+          <c:idx val="1"/>
+          <c:order val="1"/>
+          <c:tx>
+            <c:v>Lock</c:v>
+          </c:tx>
+          <c:spPr>
+            <a:ln w="22225" cap="rnd">
+              <a:solidFill>
+                <a:schemeClr val="accent2"/>
+              </a:solidFill>
+              <a:round/>
+            </a:ln>
+            <a:effectLst/>
+          </c:spPr>
+          <c:marker>
+            <c:symbol val="none"/>
+          </c:marker>
+          <c:val>
+            <c:numRef>
+              <c:f>Foglio1!$E$12:$E$16</c:f>
+              <c:numCache>
+                <c:formatCode>0.000</c:formatCode>
+                <c:ptCount val="5"/>
+                <c:pt idx="0">
+                  <c:v>1.9666666666666666E-2</c:v>
+                </c:pt>
+                <c:pt idx="1">
+                  <c:v>0.12433333333333334</c:v>
+                </c:pt>
+                <c:pt idx="2">
+                  <c:v>1.1803333333333332</c:v>
+                </c:pt>
+                <c:pt idx="3">
+                  <c:v>12.132333333333333</c:v>
+                </c:pt>
+                <c:pt idx="4">
+                  <c:v>131.36166666666665</c:v>
+                </c:pt>
+              </c:numCache>
+            </c:numRef>
+          </c:val>
+          <c:smooth val="0"/>
+          <c:extLst>
+            <c:ext xmlns:c16="http://schemas.microsoft.com/office/drawing/2014/chart" uri="{C3380CC4-5D6E-409C-BE32-E72D297353CC}">
+              <c16:uniqueId val="{00000001-8D8D-43E6-92B3-07B6705A01DD}"/>
+            </c:ext>
+          </c:extLst>
+        </c:ser>
+        <c:ser>
+          <c:idx val="2"/>
+          <c:order val="2"/>
+          <c:tx>
+            <c:v>Optimized</c:v>
+          </c:tx>
+          <c:spPr>
+            <a:ln w="22225" cap="rnd">
+              <a:solidFill>
+                <a:schemeClr val="accent3"/>
+              </a:solidFill>
+              <a:round/>
+            </a:ln>
+            <a:effectLst/>
+          </c:spPr>
+          <c:marker>
+            <c:symbol val="none"/>
+          </c:marker>
+          <c:val>
+            <c:numRef>
+              <c:f>Foglio1!$E$20:$E$24</c:f>
+              <c:numCache>
+                <c:formatCode>0.000</c:formatCode>
+                <c:ptCount val="5"/>
+                <c:pt idx="0">
+                  <c:v>2.0666666666666667E-2</c:v>
+                </c:pt>
+                <c:pt idx="1">
+                  <c:v>3.2666666666666663E-2</c:v>
+                </c:pt>
+                <c:pt idx="2">
+                  <c:v>8.900000000000001E-2</c:v>
+                </c:pt>
+                <c:pt idx="3">
+                  <c:v>0.69633333333333347</c:v>
+                </c:pt>
+                <c:pt idx="4">
+                  <c:v>5.8290000000000006</c:v>
+                </c:pt>
+              </c:numCache>
+            </c:numRef>
+          </c:val>
+          <c:smooth val="0"/>
+          <c:extLst>
+            <c:ext xmlns:c16="http://schemas.microsoft.com/office/drawing/2014/chart" uri="{C3380CC4-5D6E-409C-BE32-E72D297353CC}">
+              <c16:uniqueId val="{00000002-8D8D-43E6-92B3-07B6705A01DD}"/>
+            </c:ext>
+          </c:extLst>
+        </c:ser>
+        <c:dLbls>
+          <c:dLblPos val="ctr"/>
+          <c:showLegendKey val="0"/>
+          <c:showVal val="0"/>
+          <c:showCatName val="0"/>
+          <c:showSerName val="0"/>
+          <c:showPercent val="0"/>
+          <c:showBubbleSize val="0"/>
+        </c:dLbls>
+        <c:smooth val="0"/>
+        <c:axId val="628576831"/>
+        <c:axId val="630548687"/>
+      </c:lineChart>
+      <c:catAx>
+        <c:axId val="628576831"/>
+        <c:scaling>
+          <c:orientation val="minMax"/>
+        </c:scaling>
+        <c:delete val="0"/>
+        <c:axPos val="b"/>
+        <c:majorGridlines>
+          <c:spPr>
+            <a:ln w="9525" cap="flat" cmpd="sng" algn="ctr">
+              <a:solidFill>
+                <a:schemeClr val="dk1">
+                  <a:lumMod val="15000"/>
+                  <a:lumOff val="85000"/>
+                  <a:alpha val="54000"/>
+                </a:schemeClr>
+              </a:solidFill>
+              <a:round/>
+            </a:ln>
+            <a:effectLst/>
+          </c:spPr>
+        </c:majorGridlines>
+        <c:minorGridlines>
+          <c:spPr>
+            <a:ln w="9525" cap="flat" cmpd="sng" algn="ctr">
+              <a:solidFill>
+                <a:schemeClr val="dk1">
+                  <a:lumMod val="15000"/>
+                  <a:lumOff val="85000"/>
+                  <a:alpha val="51000"/>
+                </a:schemeClr>
+              </a:solidFill>
+              <a:round/>
+            </a:ln>
+            <a:effectLst/>
+          </c:spPr>
+        </c:minorGridlines>
+        <c:numFmt formatCode="General" sourceLinked="1"/>
+        <c:majorTickMark val="none"/>
+        <c:minorTickMark val="none"/>
+        <c:tickLblPos val="nextTo"/>
+        <c:spPr>
+          <a:noFill/>
+          <a:ln w="9525" cap="flat" cmpd="sng" algn="ctr">
+            <a:solidFill>
+              <a:schemeClr val="dk1">
+                <a:lumMod val="15000"/>
+                <a:lumOff val="85000"/>
+              </a:schemeClr>
+            </a:solidFill>
+            <a:round/>
+          </a:ln>
+          <a:effectLst/>
+        </c:spPr>
+        <c:txPr>
+          <a:bodyPr rot="-60000000" spcFirstLastPara="1" vertOverflow="ellipsis" vert="horz" wrap="square" anchor="ctr" anchorCtr="1"/>
+          <a:lstStyle/>
+          <a:p>
+            <a:pPr>
+              <a:defRPr sz="1197" b="0" i="0" u="none" strike="noStrike" kern="1200" cap="none" spc="0" normalizeH="0" baseline="0">
+                <a:solidFill>
+                  <a:schemeClr val="dk1">
+                    <a:lumMod val="65000"/>
+                    <a:lumOff val="35000"/>
+                  </a:schemeClr>
+                </a:solidFill>
+                <a:latin typeface="+mn-lt"/>
+                <a:ea typeface="+mn-ea"/>
+                <a:cs typeface="+mn-cs"/>
+              </a:defRPr>
+            </a:pPr>
+            <a:endParaRPr lang="it-IT"/>
+          </a:p>
+        </c:txPr>
+        <c:crossAx val="630548687"/>
+        <c:crosses val="autoZero"/>
+        <c:auto val="1"/>
+        <c:lblAlgn val="ctr"/>
+        <c:lblOffset val="100"/>
+        <c:noMultiLvlLbl val="0"/>
+      </c:catAx>
+      <c:valAx>
+        <c:axId val="630548687"/>
+        <c:scaling>
+          <c:orientation val="minMax"/>
+        </c:scaling>
+        <c:delete val="0"/>
+        <c:axPos val="l"/>
+        <c:majorGridlines>
+          <c:spPr>
+            <a:ln w="9525" cap="flat" cmpd="sng" algn="ctr">
+              <a:solidFill>
+                <a:schemeClr val="dk1">
+                  <a:lumMod val="15000"/>
+                  <a:lumOff val="85000"/>
+                  <a:alpha val="54000"/>
+                </a:schemeClr>
+              </a:solidFill>
+              <a:round/>
+            </a:ln>
+            <a:effectLst/>
+          </c:spPr>
+        </c:majorGridlines>
+        <c:title>
+          <c:tx>
+            <c:rich>
+              <a:bodyPr rot="-5400000" spcFirstLastPara="1" vertOverflow="ellipsis" vert="horz" wrap="square" anchor="ctr" anchorCtr="1"/>
+              <a:lstStyle/>
+              <a:p>
+                <a:pPr>
+                  <a:defRPr sz="1197" b="1" i="0" u="none" strike="noStrike" kern="1200" baseline="0">
+                    <a:solidFill>
+                      <a:schemeClr val="dk1">
+                        <a:lumMod val="65000"/>
+                        <a:lumOff val="35000"/>
+                      </a:schemeClr>
+                    </a:solidFill>
+                    <a:latin typeface="+mn-lt"/>
+                    <a:ea typeface="+mn-ea"/>
+                    <a:cs typeface="+mn-cs"/>
+                  </a:defRPr>
+                </a:pPr>
+                <a:r>
+                  <a:rPr lang="it-IT"/>
+                  <a:t> Execution Time (s)</a:t>
+                </a:r>
+              </a:p>
+            </c:rich>
+          </c:tx>
+          <c:overlay val="0"/>
+          <c:spPr>
+            <a:noFill/>
+            <a:ln>
+              <a:noFill/>
+            </a:ln>
+            <a:effectLst/>
+          </c:spPr>
+          <c:txPr>
+            <a:bodyPr rot="-5400000" spcFirstLastPara="1" vertOverflow="ellipsis" vert="horz" wrap="square" anchor="ctr" anchorCtr="1"/>
+            <a:lstStyle/>
+            <a:p>
+              <a:pPr>
+                <a:defRPr sz="1197" b="1" i="0" u="none" strike="noStrike" kern="1200" baseline="0">
+                  <a:solidFill>
+                    <a:schemeClr val="dk1">
+                      <a:lumMod val="65000"/>
+                      <a:lumOff val="35000"/>
+                    </a:schemeClr>
+                  </a:solidFill>
+                  <a:latin typeface="+mn-lt"/>
+                  <a:ea typeface="+mn-ea"/>
+                  <a:cs typeface="+mn-cs"/>
+                </a:defRPr>
+              </a:pPr>
+              <a:endParaRPr lang="it-IT"/>
+            </a:p>
+          </c:txPr>
+        </c:title>
+        <c:numFmt formatCode="0.000" sourceLinked="1"/>
+        <c:majorTickMark val="none"/>
+        <c:minorTickMark val="none"/>
+        <c:tickLblPos val="nextTo"/>
+        <c:spPr>
+          <a:noFill/>
+          <a:ln>
+            <a:noFill/>
+          </a:ln>
+          <a:effectLst/>
+        </c:spPr>
+        <c:txPr>
+          <a:bodyPr rot="-60000000" spcFirstLastPara="1" vertOverflow="ellipsis" vert="horz" wrap="square" anchor="ctr" anchorCtr="1"/>
+          <a:lstStyle/>
+          <a:p>
+            <a:pPr>
+              <a:defRPr sz="1197" b="0" i="0" u="none" strike="noStrike" kern="1200" baseline="0">
+                <a:solidFill>
+                  <a:schemeClr val="dk1">
+                    <a:lumMod val="65000"/>
+                    <a:lumOff val="35000"/>
+                  </a:schemeClr>
+                </a:solidFill>
+                <a:latin typeface="+mn-lt"/>
+                <a:ea typeface="+mn-ea"/>
+                <a:cs typeface="+mn-cs"/>
+              </a:defRPr>
+            </a:pPr>
+            <a:endParaRPr lang="it-IT"/>
+          </a:p>
+        </c:txPr>
+        <c:crossAx val="628576831"/>
+        <c:crosses val="autoZero"/>
+        <c:crossBetween val="between"/>
+      </c:valAx>
+      <c:dTable>
+        <c:showHorzBorder val="1"/>
+        <c:showVertBorder val="1"/>
+        <c:showOutline val="1"/>
+        <c:showKeys val="1"/>
+        <c:spPr>
+          <a:noFill/>
+          <a:ln w="9525" cap="flat" cmpd="sng" algn="ctr">
+            <a:solidFill>
+              <a:schemeClr val="dk1">
+                <a:lumMod val="15000"/>
+                <a:lumOff val="85000"/>
+              </a:schemeClr>
+            </a:solidFill>
+            <a:round/>
+          </a:ln>
+          <a:effectLst/>
+        </c:spPr>
+        <c:txPr>
+          <a:bodyPr rot="0" spcFirstLastPara="1" vertOverflow="ellipsis" vert="horz" wrap="square" anchor="ctr" anchorCtr="1"/>
+          <a:lstStyle/>
+          <a:p>
+            <a:pPr rtl="0">
+              <a:defRPr sz="1064" b="0" i="0" u="none" strike="noStrike" kern="1200" baseline="0">
+                <a:solidFill>
+                  <a:schemeClr val="dk1">
+                    <a:lumMod val="65000"/>
+                    <a:lumOff val="35000"/>
+                  </a:schemeClr>
+                </a:solidFill>
+                <a:latin typeface="+mn-lt"/>
+                <a:ea typeface="+mn-ea"/>
+                <a:cs typeface="+mn-cs"/>
+              </a:defRPr>
+            </a:pPr>
+            <a:endParaRPr lang="it-IT"/>
+          </a:p>
+        </c:txPr>
+      </c:dTable>
+      <c:spPr>
+        <a:pattFill prst="ltDnDiag">
+          <a:fgClr>
+            <a:schemeClr val="dk1">
+              <a:lumMod val="15000"/>
+              <a:lumOff val="85000"/>
+            </a:schemeClr>
+          </a:fgClr>
+          <a:bgClr>
+            <a:schemeClr val="lt1"/>
+          </a:bgClr>
+        </a:pattFill>
+        <a:ln>
+          <a:noFill/>
+        </a:ln>
+        <a:effectLst/>
+      </c:spPr>
+    </c:plotArea>
+    <c:plotVisOnly val="1"/>
+    <c:dispBlanksAs val="zero"/>
+    <c:showDLblsOverMax val="0"/>
+  </c:chart>
+  <c:spPr>
+    <a:solidFill>
+      <a:schemeClr val="lt1"/>
+    </a:solidFill>
+    <a:ln w="9525" cap="flat" cmpd="sng" algn="ctr">
+      <a:solidFill>
+        <a:schemeClr val="dk1">
+          <a:lumMod val="15000"/>
+          <a:lumOff val="85000"/>
+        </a:schemeClr>
+      </a:solidFill>
+      <a:round/>
+    </a:ln>
+    <a:effectLst/>
+  </c:spPr>
+  <c:txPr>
+    <a:bodyPr/>
+    <a:lstStyle/>
+    <a:p>
+      <a:pPr>
+        <a:defRPr/>
+      </a:pPr>
+      <a:endParaRPr lang="it-IT"/>
+    </a:p>
+  </c:txPr>
+  <c:externalData r:id="rId3">
+    <c:autoUpdate val="0"/>
+  </c:externalData>
+</c:chartSpace>
+</file>
+
+<file path=ppt/charts/chart2.xml><?xml version="1.0" encoding="utf-8"?>
+<c:chartSpace xmlns:c="http://schemas.openxmlformats.org/drawingml/2006/chart" xmlns:a="http://schemas.openxmlformats.org/drawingml/2006/main" xmlns:r="http://schemas.openxmlformats.org/officeDocument/2006/relationships" xmlns:c16r2="http://schemas.microsoft.com/office/drawing/2015/06/chart">
+  <c:date1904 val="0"/>
+  <c:lang val="it-IT"/>
+  <c:roundedCorners val="0"/>
+  <mc:AlternateContent xmlns:mc="http://schemas.openxmlformats.org/markup-compatibility/2006">
+    <mc:Choice xmlns:c14="http://schemas.microsoft.com/office/drawing/2007/8/2/chart" Requires="c14">
+      <c14:style val="102"/>
+    </mc:Choice>
+    <mc:Fallback>
+      <c:style val="2"/>
+    </mc:Fallback>
+  </mc:AlternateContent>
+  <c:chart>
+    <c:title>
+      <c:tx>
+        <c:rich>
+          <a:bodyPr rot="0" spcFirstLastPara="1" vertOverflow="ellipsis" vert="horz" wrap="square" anchor="ctr" anchorCtr="1"/>
+          <a:lstStyle/>
+          <a:p>
+            <a:pPr>
+              <a:defRPr sz="2128" b="1" i="0" u="none" strike="noStrike" kern="1200" cap="none" spc="0" normalizeH="0" baseline="0">
+                <a:solidFill>
+                  <a:schemeClr val="dk1">
+                    <a:lumMod val="50000"/>
+                    <a:lumOff val="50000"/>
+                  </a:schemeClr>
+                </a:solidFill>
+                <a:latin typeface="+mj-lt"/>
+                <a:ea typeface="+mj-ea"/>
+                <a:cs typeface="+mj-cs"/>
+              </a:defRPr>
+            </a:pPr>
+            <a:r>
+              <a:rPr lang="en-US"/>
+              <a:t>K</a:t>
+            </a:r>
+          </a:p>
+        </c:rich>
+      </c:tx>
+      <c:overlay val="0"/>
+      <c:spPr>
+        <a:noFill/>
+        <a:ln>
+          <a:noFill/>
+        </a:ln>
+        <a:effectLst/>
+      </c:spPr>
+      <c:txPr>
+        <a:bodyPr rot="0" spcFirstLastPara="1" vertOverflow="ellipsis" vert="horz" wrap="square" anchor="ctr" anchorCtr="1"/>
+        <a:lstStyle/>
+        <a:p>
+          <a:pPr>
+            <a:defRPr sz="2128" b="1" i="0" u="none" strike="noStrike" kern="1200" cap="none" spc="0" normalizeH="0" baseline="0">
+              <a:solidFill>
+                <a:schemeClr val="dk1">
+                  <a:lumMod val="50000"/>
+                  <a:lumOff val="50000"/>
+                </a:schemeClr>
+              </a:solidFill>
+              <a:latin typeface="+mj-lt"/>
+              <a:ea typeface="+mj-ea"/>
+              <a:cs typeface="+mj-cs"/>
+            </a:defRPr>
+          </a:pPr>
+          <a:endParaRPr lang="it-IT"/>
+        </a:p>
+      </c:txPr>
+    </c:title>
+    <c:autoTitleDeleted val="0"/>
+    <c:plotArea>
+      <c:layout/>
+      <c:lineChart>
+        <c:grouping val="standard"/>
+        <c:varyColors val="0"/>
+        <c:ser>
+          <c:idx val="0"/>
+          <c:order val="0"/>
+          <c:tx>
+            <c:v>Serial</c:v>
+          </c:tx>
+          <c:spPr>
+            <a:ln w="22225" cap="rnd">
+              <a:solidFill>
+                <a:schemeClr val="accent1"/>
+              </a:solidFill>
+              <a:round/>
+            </a:ln>
+            <a:effectLst/>
+          </c:spPr>
+          <c:marker>
+            <c:symbol val="none"/>
+          </c:marker>
+          <c:cat>
+            <c:numRef>
+              <c:f>Foglio1!$A$29:$A$33</c:f>
+              <c:numCache>
+                <c:formatCode>General</c:formatCode>
+                <c:ptCount val="5"/>
+                <c:pt idx="0">
+                  <c:v>2</c:v>
+                </c:pt>
+                <c:pt idx="1">
+                  <c:v>3</c:v>
+                </c:pt>
+                <c:pt idx="2">
+                  <c:v>4</c:v>
+                </c:pt>
+                <c:pt idx="3">
+                  <c:v>5</c:v>
+                </c:pt>
+                <c:pt idx="4">
+                  <c:v>6</c:v>
+                </c:pt>
+              </c:numCache>
+            </c:numRef>
+          </c:cat>
+          <c:val>
+            <c:numRef>
+              <c:f>Foglio1!$E$29:$E$33</c:f>
+              <c:numCache>
+                <c:formatCode>0.000</c:formatCode>
+                <c:ptCount val="5"/>
+                <c:pt idx="0">
+                  <c:v>30.608000000000001</c:v>
+                </c:pt>
+                <c:pt idx="1">
+                  <c:v>42.719533333333324</c:v>
+                </c:pt>
+                <c:pt idx="2">
+                  <c:v>44.281000000000006</c:v>
+                </c:pt>
+                <c:pt idx="3">
+                  <c:v>59.846000000000004</c:v>
+                </c:pt>
+                <c:pt idx="4">
+                  <c:v>61.000666666666667</c:v>
+                </c:pt>
+              </c:numCache>
+            </c:numRef>
+          </c:val>
+          <c:smooth val="0"/>
+          <c:extLst>
+            <c:ext xmlns:c16="http://schemas.microsoft.com/office/drawing/2014/chart" uri="{C3380CC4-5D6E-409C-BE32-E72D297353CC}">
+              <c16:uniqueId val="{00000000-1ECE-4D0C-B29F-B317850CFEC6}"/>
+            </c:ext>
+          </c:extLst>
+        </c:ser>
+        <c:ser>
+          <c:idx val="1"/>
+          <c:order val="1"/>
+          <c:tx>
+            <c:v>Lock</c:v>
+          </c:tx>
+          <c:spPr>
+            <a:ln w="22225" cap="rnd">
+              <a:solidFill>
+                <a:schemeClr val="accent2"/>
+              </a:solidFill>
+              <a:round/>
+            </a:ln>
+            <a:effectLst/>
+          </c:spPr>
+          <c:marker>
+            <c:symbol val="none"/>
+          </c:marker>
+          <c:val>
+            <c:numRef>
+              <c:f>Foglio1!$E$37:$E$41</c:f>
+              <c:numCache>
+                <c:formatCode>0.000</c:formatCode>
+                <c:ptCount val="5"/>
+                <c:pt idx="0">
+                  <c:v>50.194333333333333</c:v>
+                </c:pt>
+                <c:pt idx="1">
+                  <c:v>59.56666666666667</c:v>
+                </c:pt>
+                <c:pt idx="2">
+                  <c:v>63.129333333333328</c:v>
+                </c:pt>
+                <c:pt idx="3">
+                  <c:v>74.90333333333335</c:v>
+                </c:pt>
+                <c:pt idx="4">
+                  <c:v>76.076666666666654</c:v>
+                </c:pt>
+              </c:numCache>
+            </c:numRef>
+          </c:val>
+          <c:smooth val="0"/>
+          <c:extLst>
+            <c:ext xmlns:c16="http://schemas.microsoft.com/office/drawing/2014/chart" uri="{C3380CC4-5D6E-409C-BE32-E72D297353CC}">
+              <c16:uniqueId val="{00000001-1ECE-4D0C-B29F-B317850CFEC6}"/>
+            </c:ext>
+          </c:extLst>
+        </c:ser>
+        <c:ser>
+          <c:idx val="2"/>
+          <c:order val="2"/>
+          <c:tx>
+            <c:v>Optimized</c:v>
+          </c:tx>
+          <c:spPr>
+            <a:ln w="22225" cap="rnd">
+              <a:solidFill>
+                <a:schemeClr val="accent3"/>
+              </a:solidFill>
+              <a:round/>
+            </a:ln>
+            <a:effectLst/>
+          </c:spPr>
+          <c:marker>
+            <c:symbol val="none"/>
+          </c:marker>
+          <c:val>
+            <c:numRef>
+              <c:f>Foglio1!$E$45:$E$49</c:f>
+              <c:numCache>
+                <c:formatCode>0.000</c:formatCode>
+                <c:ptCount val="5"/>
+                <c:pt idx="0">
+                  <c:v>3.0263333333333335</c:v>
+                </c:pt>
+                <c:pt idx="1">
+                  <c:v>3.781333333333333</c:v>
+                </c:pt>
+                <c:pt idx="2">
+                  <c:v>3.9103333333333334</c:v>
+                </c:pt>
+                <c:pt idx="3">
+                  <c:v>4.6480000000000006</c:v>
+                </c:pt>
+                <c:pt idx="4">
+                  <c:v>4.9273333333333333</c:v>
+                </c:pt>
+              </c:numCache>
+            </c:numRef>
+          </c:val>
+          <c:smooth val="0"/>
+          <c:extLst>
+            <c:ext xmlns:c16="http://schemas.microsoft.com/office/drawing/2014/chart" uri="{C3380CC4-5D6E-409C-BE32-E72D297353CC}">
+              <c16:uniqueId val="{00000002-1ECE-4D0C-B29F-B317850CFEC6}"/>
+            </c:ext>
+          </c:extLst>
+        </c:ser>
+        <c:dLbls>
+          <c:showLegendKey val="0"/>
+          <c:showVal val="0"/>
+          <c:showCatName val="0"/>
+          <c:showSerName val="0"/>
+          <c:showPercent val="0"/>
+          <c:showBubbleSize val="0"/>
+        </c:dLbls>
+        <c:smooth val="0"/>
+        <c:axId val="628576831"/>
+        <c:axId val="630548687"/>
+      </c:lineChart>
+      <c:catAx>
+        <c:axId val="628576831"/>
+        <c:scaling>
+          <c:orientation val="minMax"/>
+        </c:scaling>
+        <c:delete val="0"/>
+        <c:axPos val="b"/>
+        <c:majorGridlines>
+          <c:spPr>
+            <a:ln w="9525" cap="flat" cmpd="sng" algn="ctr">
+              <a:solidFill>
+                <a:schemeClr val="dk1">
+                  <a:lumMod val="15000"/>
+                  <a:lumOff val="85000"/>
+                  <a:alpha val="54000"/>
+                </a:schemeClr>
+              </a:solidFill>
+              <a:round/>
+            </a:ln>
+            <a:effectLst/>
+          </c:spPr>
+        </c:majorGridlines>
+        <c:minorGridlines>
+          <c:spPr>
+            <a:ln w="9525" cap="flat" cmpd="sng" algn="ctr">
+              <a:solidFill>
+                <a:schemeClr val="dk1">
+                  <a:lumMod val="15000"/>
+                  <a:lumOff val="85000"/>
+                  <a:alpha val="51000"/>
+                </a:schemeClr>
+              </a:solidFill>
+              <a:round/>
+            </a:ln>
+            <a:effectLst/>
+          </c:spPr>
+        </c:minorGridlines>
+        <c:numFmt formatCode="General" sourceLinked="1"/>
+        <c:majorTickMark val="none"/>
+        <c:minorTickMark val="none"/>
+        <c:tickLblPos val="nextTo"/>
+        <c:spPr>
+          <a:noFill/>
+          <a:ln w="9525" cap="flat" cmpd="sng" algn="ctr">
+            <a:solidFill>
+              <a:schemeClr val="dk1">
+                <a:lumMod val="15000"/>
+                <a:lumOff val="85000"/>
+              </a:schemeClr>
+            </a:solidFill>
+            <a:round/>
+          </a:ln>
+          <a:effectLst/>
+        </c:spPr>
+        <c:txPr>
+          <a:bodyPr rot="-60000000" spcFirstLastPara="1" vertOverflow="ellipsis" vert="horz" wrap="square" anchor="ctr" anchorCtr="1"/>
+          <a:lstStyle/>
+          <a:p>
+            <a:pPr>
+              <a:defRPr sz="1197" b="0" i="0" u="none" strike="noStrike" kern="1200" cap="none" spc="0" normalizeH="0" baseline="0">
+                <a:solidFill>
+                  <a:schemeClr val="dk1">
+                    <a:lumMod val="65000"/>
+                    <a:lumOff val="35000"/>
+                  </a:schemeClr>
+                </a:solidFill>
+                <a:latin typeface="+mn-lt"/>
+                <a:ea typeface="+mn-ea"/>
+                <a:cs typeface="+mn-cs"/>
+              </a:defRPr>
+            </a:pPr>
+            <a:endParaRPr lang="it-IT"/>
+          </a:p>
+        </c:txPr>
+        <c:crossAx val="630548687"/>
+        <c:crosses val="autoZero"/>
+        <c:auto val="1"/>
+        <c:lblAlgn val="ctr"/>
+        <c:lblOffset val="100"/>
+        <c:noMultiLvlLbl val="0"/>
+      </c:catAx>
+      <c:valAx>
+        <c:axId val="630548687"/>
+        <c:scaling>
+          <c:orientation val="minMax"/>
+        </c:scaling>
+        <c:delete val="0"/>
+        <c:axPos val="l"/>
+        <c:majorGridlines>
+          <c:spPr>
+            <a:ln w="9525" cap="flat" cmpd="sng" algn="ctr">
+              <a:solidFill>
+                <a:schemeClr val="dk1">
+                  <a:lumMod val="15000"/>
+                  <a:lumOff val="85000"/>
+                  <a:alpha val="54000"/>
+                </a:schemeClr>
+              </a:solidFill>
+              <a:round/>
+            </a:ln>
+            <a:effectLst/>
+          </c:spPr>
+        </c:majorGridlines>
+        <c:title>
+          <c:tx>
+            <c:rich>
+              <a:bodyPr rot="-5400000" spcFirstLastPara="1" vertOverflow="ellipsis" vert="horz" wrap="square" anchor="ctr" anchorCtr="1"/>
+              <a:lstStyle/>
+              <a:p>
+                <a:pPr>
+                  <a:defRPr sz="1197" b="1" i="0" u="none" strike="noStrike" kern="1200" baseline="0">
+                    <a:solidFill>
+                      <a:schemeClr val="dk1">
+                        <a:lumMod val="65000"/>
+                        <a:lumOff val="35000"/>
+                      </a:schemeClr>
+                    </a:solidFill>
+                    <a:latin typeface="+mn-lt"/>
+                    <a:ea typeface="+mn-ea"/>
+                    <a:cs typeface="+mn-cs"/>
+                  </a:defRPr>
+                </a:pPr>
+                <a:r>
+                  <a:rPr lang="it-IT"/>
+                  <a:t>Execution Time (s)</a:t>
+                </a:r>
+              </a:p>
+            </c:rich>
+          </c:tx>
+          <c:overlay val="0"/>
+          <c:spPr>
+            <a:noFill/>
+            <a:ln>
+              <a:noFill/>
+            </a:ln>
+            <a:effectLst/>
+          </c:spPr>
+          <c:txPr>
+            <a:bodyPr rot="-5400000" spcFirstLastPara="1" vertOverflow="ellipsis" vert="horz" wrap="square" anchor="ctr" anchorCtr="1"/>
+            <a:lstStyle/>
+            <a:p>
+              <a:pPr>
+                <a:defRPr sz="1197" b="1" i="0" u="none" strike="noStrike" kern="1200" baseline="0">
+                  <a:solidFill>
+                    <a:schemeClr val="dk1">
+                      <a:lumMod val="65000"/>
+                      <a:lumOff val="35000"/>
+                    </a:schemeClr>
+                  </a:solidFill>
+                  <a:latin typeface="+mn-lt"/>
+                  <a:ea typeface="+mn-ea"/>
+                  <a:cs typeface="+mn-cs"/>
+                </a:defRPr>
+              </a:pPr>
+              <a:endParaRPr lang="it-IT"/>
+            </a:p>
+          </c:txPr>
+        </c:title>
+        <c:numFmt formatCode="0.000" sourceLinked="1"/>
+        <c:majorTickMark val="none"/>
+        <c:minorTickMark val="none"/>
+        <c:tickLblPos val="nextTo"/>
+        <c:spPr>
+          <a:noFill/>
+          <a:ln>
+            <a:noFill/>
+          </a:ln>
+          <a:effectLst/>
+        </c:spPr>
+        <c:txPr>
+          <a:bodyPr rot="-60000000" spcFirstLastPara="1" vertOverflow="ellipsis" vert="horz" wrap="square" anchor="ctr" anchorCtr="1"/>
+          <a:lstStyle/>
+          <a:p>
+            <a:pPr>
+              <a:defRPr sz="1197" b="0" i="0" u="none" strike="noStrike" kern="1200" baseline="0">
+                <a:solidFill>
+                  <a:schemeClr val="dk1">
+                    <a:lumMod val="65000"/>
+                    <a:lumOff val="35000"/>
+                  </a:schemeClr>
+                </a:solidFill>
+                <a:latin typeface="+mn-lt"/>
+                <a:ea typeface="+mn-ea"/>
+                <a:cs typeface="+mn-cs"/>
+              </a:defRPr>
+            </a:pPr>
+            <a:endParaRPr lang="it-IT"/>
+          </a:p>
+        </c:txPr>
+        <c:crossAx val="628576831"/>
+        <c:crosses val="autoZero"/>
+        <c:crossBetween val="between"/>
+      </c:valAx>
+      <c:dTable>
+        <c:showHorzBorder val="1"/>
+        <c:showVertBorder val="1"/>
+        <c:showOutline val="1"/>
+        <c:showKeys val="1"/>
+        <c:spPr>
+          <a:noFill/>
+          <a:ln w="9525" cap="flat" cmpd="sng" algn="ctr">
+            <a:solidFill>
+              <a:schemeClr val="dk1">
+                <a:lumMod val="15000"/>
+                <a:lumOff val="85000"/>
+              </a:schemeClr>
+            </a:solidFill>
+            <a:round/>
+          </a:ln>
+          <a:effectLst/>
+        </c:spPr>
+        <c:txPr>
+          <a:bodyPr rot="0" spcFirstLastPara="1" vertOverflow="ellipsis" vert="horz" wrap="square" anchor="ctr" anchorCtr="1"/>
+          <a:lstStyle/>
+          <a:p>
+            <a:pPr rtl="0">
+              <a:defRPr sz="1064" b="0" i="0" u="none" strike="noStrike" kern="1200" baseline="0">
+                <a:solidFill>
+                  <a:schemeClr val="dk1">
+                    <a:lumMod val="65000"/>
+                    <a:lumOff val="35000"/>
+                  </a:schemeClr>
+                </a:solidFill>
+                <a:latin typeface="+mn-lt"/>
+                <a:ea typeface="+mn-ea"/>
+                <a:cs typeface="+mn-cs"/>
+              </a:defRPr>
+            </a:pPr>
+            <a:endParaRPr lang="it-IT"/>
+          </a:p>
+        </c:txPr>
+      </c:dTable>
+      <c:spPr>
+        <a:pattFill prst="ltDnDiag">
+          <a:fgClr>
+            <a:schemeClr val="dk1">
+              <a:lumMod val="15000"/>
+              <a:lumOff val="85000"/>
+            </a:schemeClr>
+          </a:fgClr>
+          <a:bgClr>
+            <a:schemeClr val="lt1"/>
+          </a:bgClr>
+        </a:pattFill>
+        <a:ln>
+          <a:noFill/>
+        </a:ln>
+        <a:effectLst/>
+      </c:spPr>
+    </c:plotArea>
+    <c:plotVisOnly val="1"/>
+    <c:dispBlanksAs val="zero"/>
+    <c:showDLblsOverMax val="0"/>
+  </c:chart>
+  <c:spPr>
+    <a:solidFill>
+      <a:schemeClr val="lt1"/>
+    </a:solidFill>
+    <a:ln w="9525" cap="flat" cmpd="sng" algn="ctr">
+      <a:solidFill>
+        <a:schemeClr val="dk1">
+          <a:lumMod val="15000"/>
+          <a:lumOff val="85000"/>
+        </a:schemeClr>
+      </a:solidFill>
+      <a:round/>
+    </a:ln>
+    <a:effectLst/>
+  </c:spPr>
+  <c:txPr>
+    <a:bodyPr/>
+    <a:lstStyle/>
+    <a:p>
+      <a:pPr>
+        <a:defRPr/>
+      </a:pPr>
+      <a:endParaRPr lang="it-IT"/>
+    </a:p>
+  </c:txPr>
+  <c:externalData r:id="rId3">
+    <c:autoUpdate val="0"/>
+  </c:externalData>
+</c:chartSpace>
+</file>
+
+<file path=ppt/charts/colors1.xml><?xml version="1.0" encoding="utf-8"?>
+<cs:colorStyle xmlns:cs="http://schemas.microsoft.com/office/drawing/2012/chartStyle" xmlns:a="http://schemas.openxmlformats.org/drawingml/2006/main" meth="cycle" id="10">
+  <a:schemeClr val="accent1"/>
+  <a:schemeClr val="accent2"/>
+  <a:schemeClr val="accent3"/>
+  <a:schemeClr val="accent4"/>
+  <a:schemeClr val="accent5"/>
+  <a:schemeClr val="accent6"/>
+  <cs:variation/>
+  <cs:variation>
+    <a:lumMod val="60000"/>
+  </cs:variation>
+  <cs:variation>
+    <a:lumMod val="80000"/>
+    <a:lumOff val="20000"/>
+  </cs:variation>
+  <cs:variation>
+    <a:lumMod val="80000"/>
+  </cs:variation>
+  <cs:variation>
+    <a:lumMod val="60000"/>
+    <a:lumOff val="40000"/>
+  </cs:variation>
+  <cs:variation>
+    <a:lumMod val="50000"/>
+  </cs:variation>
+  <cs:variation>
+    <a:lumMod val="70000"/>
+    <a:lumOff val="30000"/>
+  </cs:variation>
+  <cs:variation>
+    <a:lumMod val="70000"/>
+  </cs:variation>
+  <cs:variation>
+    <a:lumMod val="50000"/>
+    <a:lumOff val="50000"/>
+  </cs:variation>
+</cs:colorStyle>
+</file>
+
+<file path=ppt/charts/colors2.xml><?xml version="1.0" encoding="utf-8"?>
+<cs:colorStyle xmlns:cs="http://schemas.microsoft.com/office/drawing/2012/chartStyle" xmlns:a="http://schemas.openxmlformats.org/drawingml/2006/main" meth="cycle" id="10">
+  <a:schemeClr val="accent1"/>
+  <a:schemeClr val="accent2"/>
+  <a:schemeClr val="accent3"/>
+  <a:schemeClr val="accent4"/>
+  <a:schemeClr val="accent5"/>
+  <a:schemeClr val="accent6"/>
+  <cs:variation/>
+  <cs:variation>
+    <a:lumMod val="60000"/>
+  </cs:variation>
+  <cs:variation>
+    <a:lumMod val="80000"/>
+    <a:lumOff val="20000"/>
+  </cs:variation>
+  <cs:variation>
+    <a:lumMod val="80000"/>
+  </cs:variation>
+  <cs:variation>
+    <a:lumMod val="60000"/>
+    <a:lumOff val="40000"/>
+  </cs:variation>
+  <cs:variation>
+    <a:lumMod val="50000"/>
+  </cs:variation>
+  <cs:variation>
+    <a:lumMod val="70000"/>
+    <a:lumOff val="30000"/>
+  </cs:variation>
+  <cs:variation>
+    <a:lumMod val="70000"/>
+  </cs:variation>
+  <cs:variation>
+    <a:lumMod val="50000"/>
+    <a:lumOff val="50000"/>
+  </cs:variation>
+</cs:colorStyle>
+</file>
+
+<file path=ppt/charts/style1.xml><?xml version="1.0" encoding="utf-8"?>
+<cs:chartStyle xmlns:cs="http://schemas.microsoft.com/office/drawing/2012/chartStyle" xmlns:a="http://schemas.openxmlformats.org/drawingml/2006/main" id="232">
+  <cs:axisTitle>
+    <cs:lnRef idx="0"/>
+    <cs:fillRef idx="0"/>
+    <cs:effectRef idx="0"/>
+    <cs:fontRef idx="minor">
+      <a:schemeClr val="dk1">
+        <a:lumMod val="65000"/>
+        <a:lumOff val="35000"/>
+      </a:schemeClr>
+    </cs:fontRef>
+    <cs:defRPr sz="1197" b="1" kern="1200"/>
+  </cs:axisTitle>
+  <cs:categoryAxis>
+    <cs:lnRef idx="0"/>
+    <cs:fillRef idx="0"/>
+    <cs:effectRef idx="0"/>
+    <cs:fontRef idx="minor">
+      <a:schemeClr val="dk1">
+        <a:lumMod val="65000"/>
+        <a:lumOff val="35000"/>
+      </a:schemeClr>
+    </cs:fontRef>
+    <cs:spPr>
+      <a:ln w="9525" cap="flat" cmpd="sng" algn="ctr">
+        <a:solidFill>
+          <a:schemeClr val="dk1">
+            <a:lumMod val="15000"/>
+            <a:lumOff val="85000"/>
+          </a:schemeClr>
+        </a:solidFill>
+        <a:round/>
+      </a:ln>
+    </cs:spPr>
+    <cs:defRPr sz="1197" kern="1200" cap="none" spc="0" normalizeH="0" baseline="0"/>
+  </cs:categoryAxis>
+  <cs:chartArea>
+    <cs:lnRef idx="0"/>
+    <cs:fillRef idx="0"/>
+    <cs:effectRef idx="0"/>
+    <cs:fontRef idx="minor">
+      <a:schemeClr val="dk1"/>
+    </cs:fontRef>
+    <cs:spPr>
+      <a:solidFill>
+        <a:schemeClr val="lt1"/>
+      </a:solidFill>
+      <a:ln w="9525" cap="flat" cmpd="sng" algn="ctr">
+        <a:solidFill>
+          <a:schemeClr val="dk1">
+            <a:lumMod val="15000"/>
+            <a:lumOff val="85000"/>
+          </a:schemeClr>
+        </a:solidFill>
+        <a:round/>
+      </a:ln>
+    </cs:spPr>
+    <cs:defRPr sz="1197" kern="1200"/>
+  </cs:chartArea>
+  <cs:dataLabel>
+    <cs:lnRef idx="0"/>
+    <cs:fillRef idx="0"/>
+    <cs:effectRef idx="0"/>
+    <cs:fontRef idx="minor">
+      <a:schemeClr val="dk1">
+        <a:lumMod val="75000"/>
+        <a:lumOff val="25000"/>
+      </a:schemeClr>
+    </cs:fontRef>
+    <cs:defRPr sz="1197" kern="1200"/>
+  </cs:dataLabel>
+  <cs:dataLabelCallout>
+    <cs:lnRef idx="0"/>
+    <cs:fillRef idx="0"/>
+    <cs:effectRef idx="0"/>
+    <cs:fontRef idx="minor">
+      <a:schemeClr val="dk1">
+        <a:lumMod val="65000"/>
+        <a:lumOff val="35000"/>
+      </a:schemeClr>
+    </cs:fontRef>
+    <cs:spPr>
+      <a:solidFill>
+        <a:schemeClr val="lt1"/>
+      </a:solidFill>
+      <a:ln>
+        <a:solidFill>
+          <a:schemeClr val="dk1">
+            <a:lumMod val="25000"/>
+            <a:lumOff val="75000"/>
+          </a:schemeClr>
+        </a:solidFill>
+      </a:ln>
+    </cs:spPr>
+    <cs:defRPr sz="1197" kern="1200"/>
+    <cs:bodyPr rot="0" spcFirstLastPara="1" vertOverflow="clip" horzOverflow="clip" vert="horz" wrap="square" lIns="36576" tIns="18288" rIns="36576" bIns="18288" anchor="ctr" anchorCtr="1">
+      <a:spAutoFit/>
+    </cs:bodyPr>
+  </cs:dataLabelCallout>
+  <cs:dataPoint>
+    <cs:lnRef idx="0"/>
+    <cs:fillRef idx="0">
+      <cs:styleClr val="auto"/>
+    </cs:fillRef>
+    <cs:effectRef idx="0"/>
+    <cs:fontRef idx="minor">
+      <a:schemeClr val="dk1"/>
+    </cs:fontRef>
+    <cs:spPr>
+      <a:solidFill>
+        <a:schemeClr val="phClr"/>
+      </a:solidFill>
+    </cs:spPr>
+  </cs:dataPoint>
+  <cs:dataPoint3D>
+    <cs:lnRef idx="0"/>
+    <cs:fillRef idx="0">
+      <cs:styleClr val="auto"/>
+    </cs:fillRef>
+    <cs:effectRef idx="0"/>
+    <cs:fontRef idx="minor">
+      <a:schemeClr val="dk1"/>
+    </cs:fontRef>
+    <cs:spPr>
+      <a:solidFill>
+        <a:schemeClr val="phClr"/>
+      </a:solidFill>
+    </cs:spPr>
+  </cs:dataPoint3D>
+  <cs:dataPointLine>
+    <cs:lnRef idx="0">
+      <cs:styleClr val="auto"/>
+    </cs:lnRef>
+    <cs:fillRef idx="0"/>
+    <cs:effectRef idx="0"/>
+    <cs:fontRef idx="minor">
+      <a:schemeClr val="dk1"/>
+    </cs:fontRef>
+    <cs:spPr>
+      <a:ln w="22225" cap="rnd">
+        <a:solidFill>
+          <a:schemeClr val="phClr"/>
+        </a:solidFill>
+        <a:round/>
+      </a:ln>
+    </cs:spPr>
+  </cs:dataPointLine>
+  <cs:dataPointMarker>
+    <cs:lnRef idx="0">
+      <cs:styleClr val="auto"/>
+    </cs:lnRef>
+    <cs:fillRef idx="0">
+      <cs:styleClr val="auto"/>
+    </cs:fillRef>
+    <cs:effectRef idx="0"/>
+    <cs:fontRef idx="minor">
+      <a:schemeClr val="dk1"/>
+    </cs:fontRef>
+    <cs:spPr>
+      <a:solidFill>
+        <a:schemeClr val="lt1"/>
+      </a:solidFill>
+      <a:ln w="15875">
+        <a:solidFill>
+          <a:schemeClr val="phClr"/>
+        </a:solidFill>
+        <a:round/>
+      </a:ln>
+    </cs:spPr>
+  </cs:dataPointMarker>
+  <cs:dataPointMarkerLayout symbol="circle" size="6"/>
+  <cs:dataPointWireframe>
+    <cs:lnRef idx="0">
+      <cs:styleClr val="auto"/>
+    </cs:lnRef>
+    <cs:fillRef idx="0"/>
+    <cs:effectRef idx="0"/>
+    <cs:fontRef idx="minor">
+      <a:schemeClr val="dk1"/>
+    </cs:fontRef>
+    <cs:spPr>
+      <a:ln w="9525" cap="rnd">
+        <a:solidFill>
+          <a:schemeClr val="phClr"/>
+        </a:solidFill>
+        <a:round/>
+      </a:ln>
+    </cs:spPr>
+  </cs:dataPointWireframe>
+  <cs:dataTable>
+    <cs:lnRef idx="0"/>
+    <cs:fillRef idx="0"/>
+    <cs:effectRef idx="0"/>
+    <cs:fontRef idx="minor">
+      <a:schemeClr val="dk1">
+        <a:lumMod val="65000"/>
+        <a:lumOff val="35000"/>
+      </a:schemeClr>
+    </cs:fontRef>
+    <cs:spPr>
+      <a:ln w="9525" cap="flat" cmpd="sng" algn="ctr">
+        <a:solidFill>
+          <a:schemeClr val="dk1">
+            <a:lumMod val="15000"/>
+            <a:lumOff val="85000"/>
+          </a:schemeClr>
+        </a:solidFill>
+        <a:round/>
+      </a:ln>
+    </cs:spPr>
+    <cs:defRPr sz="1064" kern="1200"/>
+  </cs:dataTable>
+  <cs:downBar>
+    <cs:lnRef idx="0"/>
+    <cs:fillRef idx="0"/>
+    <cs:effectRef idx="0"/>
+    <cs:fontRef idx="minor">
+      <a:schemeClr val="dk1"/>
+    </cs:fontRef>
+    <cs:spPr>
+      <a:solidFill>
+        <a:schemeClr val="dk1">
+          <a:lumMod val="75000"/>
+          <a:lumOff val="25000"/>
+        </a:schemeClr>
+      </a:solidFill>
+      <a:ln w="9525" cap="flat" cmpd="sng" algn="ctr">
+        <a:solidFill>
+          <a:schemeClr val="dk1">
+            <a:lumMod val="50000"/>
+            <a:lumOff val="50000"/>
+          </a:schemeClr>
+        </a:solidFill>
+        <a:round/>
+      </a:ln>
+    </cs:spPr>
+  </cs:downBar>
+  <cs:dropLine>
+    <cs:lnRef idx="0"/>
+    <cs:fillRef idx="0"/>
+    <cs:effectRef idx="0"/>
+    <cs:fontRef idx="minor">
+      <a:schemeClr val="dk1"/>
+    </cs:fontRef>
+    <cs:spPr>
+      <a:ln w="9525" cap="flat" cmpd="sng" algn="ctr">
+        <a:solidFill>
+          <a:schemeClr val="dk1">
+            <a:lumMod val="35000"/>
+            <a:lumOff val="65000"/>
+          </a:schemeClr>
+        </a:solidFill>
+        <a:round/>
+      </a:ln>
+    </cs:spPr>
+  </cs:dropLine>
+  <cs:errorBar>
+    <cs:lnRef idx="0"/>
+    <cs:fillRef idx="0"/>
+    <cs:effectRef idx="0"/>
+    <cs:fontRef idx="minor">
+      <a:schemeClr val="dk1"/>
+    </cs:fontRef>
+    <cs:spPr>
+      <a:ln w="9525" cap="flat" cmpd="sng" algn="ctr">
+        <a:solidFill>
+          <a:schemeClr val="dk1">
+            <a:lumMod val="50000"/>
+            <a:lumOff val="50000"/>
+          </a:schemeClr>
+        </a:solidFill>
+        <a:round/>
+      </a:ln>
+    </cs:spPr>
+  </cs:errorBar>
+  <cs:floor>
+    <cs:lnRef idx="0"/>
+    <cs:fillRef idx="0"/>
+    <cs:effectRef idx="0"/>
+    <cs:fontRef idx="minor">
+      <a:schemeClr val="dk1"/>
+    </cs:fontRef>
+    <cs:spPr>
+      <a:pattFill prst="ltDnDiag">
+        <a:fgClr>
+          <a:schemeClr val="dk1">
+            <a:lumMod val="15000"/>
+            <a:lumOff val="85000"/>
+          </a:schemeClr>
+        </a:fgClr>
+        <a:bgClr>
+          <a:schemeClr val="lt1"/>
+        </a:bgClr>
+      </a:pattFill>
+    </cs:spPr>
+  </cs:floor>
+  <cs:gridlineMajor>
+    <cs:lnRef idx="0"/>
+    <cs:fillRef idx="0"/>
+    <cs:effectRef idx="0"/>
+    <cs:fontRef idx="minor">
+      <a:schemeClr val="dk1"/>
+    </cs:fontRef>
+    <cs:spPr>
+      <a:ln w="9525" cap="flat" cmpd="sng" algn="ctr">
+        <a:solidFill>
+          <a:schemeClr val="dk1">
+            <a:lumMod val="15000"/>
+            <a:lumOff val="85000"/>
+            <a:alpha val="54000"/>
+          </a:schemeClr>
+        </a:solidFill>
+        <a:round/>
+      </a:ln>
+    </cs:spPr>
+  </cs:gridlineMajor>
+  <cs:gridlineMinor>
+    <cs:lnRef idx="0"/>
+    <cs:fillRef idx="0"/>
+    <cs:effectRef idx="0"/>
+    <cs:fontRef idx="minor">
+      <a:schemeClr val="dk1"/>
+    </cs:fontRef>
+    <cs:spPr>
+      <a:ln w="9525" cap="flat" cmpd="sng" algn="ctr">
+        <a:solidFill>
+          <a:schemeClr val="dk1">
+            <a:lumMod val="15000"/>
+            <a:lumOff val="85000"/>
+            <a:alpha val="51000"/>
+          </a:schemeClr>
+        </a:solidFill>
+        <a:round/>
+      </a:ln>
+    </cs:spPr>
+  </cs:gridlineMinor>
+  <cs:hiLoLine>
+    <cs:lnRef idx="0"/>
+    <cs:fillRef idx="0"/>
+    <cs:effectRef idx="0"/>
+    <cs:fontRef idx="minor">
+      <a:schemeClr val="dk1"/>
+    </cs:fontRef>
+    <cs:spPr>
+      <a:ln w="9525" cap="flat" cmpd="sng" algn="ctr">
+        <a:solidFill>
+          <a:schemeClr val="dk1">
+            <a:lumMod val="35000"/>
+            <a:lumOff val="65000"/>
+          </a:schemeClr>
+        </a:solidFill>
+        <a:round/>
+      </a:ln>
+    </cs:spPr>
+  </cs:hiLoLine>
+  <cs:leaderLine>
+    <cs:lnRef idx="0"/>
+    <cs:fillRef idx="0"/>
+    <cs:effectRef idx="0"/>
+    <cs:fontRef idx="minor">
+      <a:schemeClr val="dk1"/>
+    </cs:fontRef>
+    <cs:spPr>
+      <a:ln w="9525" cap="flat" cmpd="sng" algn="ctr">
+        <a:solidFill>
+          <a:schemeClr val="dk1">
+            <a:lumMod val="35000"/>
+            <a:lumOff val="65000"/>
+          </a:schemeClr>
+        </a:solidFill>
+        <a:round/>
+      </a:ln>
+    </cs:spPr>
+  </cs:leaderLine>
+  <cs:legend>
+    <cs:lnRef idx="0"/>
+    <cs:fillRef idx="0"/>
+    <cs:effectRef idx="0"/>
+    <cs:fontRef idx="minor">
+      <a:schemeClr val="dk1">
+        <a:lumMod val="65000"/>
+        <a:lumOff val="35000"/>
+      </a:schemeClr>
+    </cs:fontRef>
+    <cs:defRPr sz="1197" kern="1200"/>
+  </cs:legend>
+  <cs:plotArea>
+    <cs:lnRef idx="0"/>
+    <cs:fillRef idx="0"/>
+    <cs:effectRef idx="0"/>
+    <cs:fontRef idx="minor">
+      <a:schemeClr val="dk1"/>
+    </cs:fontRef>
+    <cs:spPr>
+      <a:pattFill prst="ltDnDiag">
+        <a:fgClr>
+          <a:schemeClr val="dk1">
+            <a:lumMod val="15000"/>
+            <a:lumOff val="85000"/>
+          </a:schemeClr>
+        </a:fgClr>
+        <a:bgClr>
+          <a:schemeClr val="lt1"/>
+        </a:bgClr>
+      </a:pattFill>
+    </cs:spPr>
+  </cs:plotArea>
+  <cs:plotArea3D>
+    <cs:lnRef idx="0"/>
+    <cs:fillRef idx="0"/>
+    <cs:effectRef idx="0"/>
+    <cs:fontRef idx="minor">
+      <a:schemeClr val="dk1"/>
+    </cs:fontRef>
+    <cs:spPr>
+      <a:solidFill>
+        <a:schemeClr val="lt1"/>
+      </a:solidFill>
+    </cs:spPr>
+  </cs:plotArea3D>
+  <cs:seriesAxis>
+    <cs:lnRef idx="0"/>
+    <cs:fillRef idx="0"/>
+    <cs:effectRef idx="0"/>
+    <cs:fontRef idx="minor">
+      <a:schemeClr val="dk1">
+        <a:lumMod val="65000"/>
+        <a:lumOff val="35000"/>
+      </a:schemeClr>
+    </cs:fontRef>
+    <cs:defRPr sz="1197" kern="1200"/>
+  </cs:seriesAxis>
+  <cs:seriesLine>
+    <cs:lnRef idx="0"/>
+    <cs:fillRef idx="0"/>
+    <cs:effectRef idx="0"/>
+    <cs:fontRef idx="minor">
+      <a:schemeClr val="dk1"/>
+    </cs:fontRef>
+    <cs:spPr>
+      <a:ln w="9525" cap="flat" cmpd="sng" algn="ctr">
+        <a:solidFill>
+          <a:schemeClr val="dk1">
+            <a:lumMod val="35000"/>
+            <a:lumOff val="65000"/>
+          </a:schemeClr>
+        </a:solidFill>
+        <a:round/>
+      </a:ln>
+    </cs:spPr>
+  </cs:seriesLine>
+  <cs:title>
+    <cs:lnRef idx="0"/>
+    <cs:fillRef idx="0"/>
+    <cs:effectRef idx="0"/>
+    <cs:fontRef idx="major">
+      <a:schemeClr val="dk1">
+        <a:lumMod val="50000"/>
+        <a:lumOff val="50000"/>
+      </a:schemeClr>
+    </cs:fontRef>
+    <cs:defRPr sz="2128" b="1" kern="1200" cap="none" spc="0" normalizeH="0" baseline="0"/>
+  </cs:title>
+  <cs:trendline>
+    <cs:lnRef idx="0">
+      <cs:styleClr val="auto"/>
+    </cs:lnRef>
+    <cs:fillRef idx="0"/>
+    <cs:effectRef idx="0"/>
+    <cs:fontRef idx="minor">
+      <a:schemeClr val="dk1"/>
+    </cs:fontRef>
+    <cs:spPr>
+      <a:ln w="19050" cap="rnd">
+        <a:solidFill>
+          <a:schemeClr val="phClr"/>
+        </a:solidFill>
+      </a:ln>
+    </cs:spPr>
+  </cs:trendline>
+  <cs:trendlineLabel>
+    <cs:lnRef idx="0"/>
+    <cs:fillRef idx="0"/>
+    <cs:effectRef idx="0"/>
+    <cs:fontRef idx="minor">
+      <a:schemeClr val="dk1">
+        <a:lumMod val="65000"/>
+        <a:lumOff val="35000"/>
+      </a:schemeClr>
+    </cs:fontRef>
+    <cs:defRPr sz="1197" kern="1200"/>
+  </cs:trendlineLabel>
+  <cs:upBar>
+    <cs:lnRef idx="0"/>
+    <cs:fillRef idx="0"/>
+    <cs:effectRef idx="0"/>
+    <cs:fontRef idx="minor">
+      <a:schemeClr val="dk1"/>
+    </cs:fontRef>
+    <cs:spPr>
+      <a:solidFill>
+        <a:schemeClr val="lt1"/>
+      </a:solidFill>
+      <a:ln w="9525" cap="flat" cmpd="sng" algn="ctr">
+        <a:solidFill>
+          <a:schemeClr val="dk1">
+            <a:lumMod val="50000"/>
+            <a:lumOff val="50000"/>
+          </a:schemeClr>
+        </a:solidFill>
+        <a:round/>
+      </a:ln>
+    </cs:spPr>
+  </cs:upBar>
+  <cs:valueAxis>
+    <cs:lnRef idx="0"/>
+    <cs:fillRef idx="0"/>
+    <cs:effectRef idx="0"/>
+    <cs:fontRef idx="minor">
+      <a:schemeClr val="dk1">
+        <a:lumMod val="65000"/>
+        <a:lumOff val="35000"/>
+      </a:schemeClr>
+    </cs:fontRef>
+    <cs:defRPr sz="1197" kern="1200"/>
+  </cs:valueAxis>
+  <cs:wall>
+    <cs:lnRef idx="0"/>
+    <cs:fillRef idx="0"/>
+    <cs:effectRef idx="0"/>
+    <cs:fontRef idx="minor">
+      <a:schemeClr val="dk1"/>
+    </cs:fontRef>
+    <cs:spPr>
+      <a:pattFill prst="ltDnDiag">
+        <a:fgClr>
+          <a:schemeClr val="dk1">
+            <a:lumMod val="15000"/>
+            <a:lumOff val="85000"/>
+          </a:schemeClr>
+        </a:fgClr>
+        <a:bgClr>
+          <a:schemeClr val="lt1"/>
+        </a:bgClr>
+      </a:pattFill>
+    </cs:spPr>
+  </cs:wall>
+</cs:chartStyle>
+</file>
+
+<file path=ppt/charts/style2.xml><?xml version="1.0" encoding="utf-8"?>
+<cs:chartStyle xmlns:cs="http://schemas.microsoft.com/office/drawing/2012/chartStyle" xmlns:a="http://schemas.openxmlformats.org/drawingml/2006/main" id="232">
+  <cs:axisTitle>
+    <cs:lnRef idx="0"/>
+    <cs:fillRef idx="0"/>
+    <cs:effectRef idx="0"/>
+    <cs:fontRef idx="minor">
+      <a:schemeClr val="dk1">
+        <a:lumMod val="65000"/>
+        <a:lumOff val="35000"/>
+      </a:schemeClr>
+    </cs:fontRef>
+    <cs:defRPr sz="1197" b="1" kern="1200"/>
+  </cs:axisTitle>
+  <cs:categoryAxis>
+    <cs:lnRef idx="0"/>
+    <cs:fillRef idx="0"/>
+    <cs:effectRef idx="0"/>
+    <cs:fontRef idx="minor">
+      <a:schemeClr val="dk1">
+        <a:lumMod val="65000"/>
+        <a:lumOff val="35000"/>
+      </a:schemeClr>
+    </cs:fontRef>
+    <cs:spPr>
+      <a:ln w="9525" cap="flat" cmpd="sng" algn="ctr">
+        <a:solidFill>
+          <a:schemeClr val="dk1">
+            <a:lumMod val="15000"/>
+            <a:lumOff val="85000"/>
+          </a:schemeClr>
+        </a:solidFill>
+        <a:round/>
+      </a:ln>
+    </cs:spPr>
+    <cs:defRPr sz="1197" kern="1200" cap="none" spc="0" normalizeH="0" baseline="0"/>
+  </cs:categoryAxis>
+  <cs:chartArea>
+    <cs:lnRef idx="0"/>
+    <cs:fillRef idx="0"/>
+    <cs:effectRef idx="0"/>
+    <cs:fontRef idx="minor">
+      <a:schemeClr val="dk1"/>
+    </cs:fontRef>
+    <cs:spPr>
+      <a:solidFill>
+        <a:schemeClr val="lt1"/>
+      </a:solidFill>
+      <a:ln w="9525" cap="flat" cmpd="sng" algn="ctr">
+        <a:solidFill>
+          <a:schemeClr val="dk1">
+            <a:lumMod val="15000"/>
+            <a:lumOff val="85000"/>
+          </a:schemeClr>
+        </a:solidFill>
+        <a:round/>
+      </a:ln>
+    </cs:spPr>
+    <cs:defRPr sz="1197" kern="1200"/>
+  </cs:chartArea>
+  <cs:dataLabel>
+    <cs:lnRef idx="0"/>
+    <cs:fillRef idx="0"/>
+    <cs:effectRef idx="0"/>
+    <cs:fontRef idx="minor">
+      <a:schemeClr val="dk1">
+        <a:lumMod val="75000"/>
+        <a:lumOff val="25000"/>
+      </a:schemeClr>
+    </cs:fontRef>
+    <cs:defRPr sz="1197" kern="1200"/>
+  </cs:dataLabel>
+  <cs:dataLabelCallout>
+    <cs:lnRef idx="0"/>
+    <cs:fillRef idx="0"/>
+    <cs:effectRef idx="0"/>
+    <cs:fontRef idx="minor">
+      <a:schemeClr val="dk1">
+        <a:lumMod val="65000"/>
+        <a:lumOff val="35000"/>
+      </a:schemeClr>
+    </cs:fontRef>
+    <cs:spPr>
+      <a:solidFill>
+        <a:schemeClr val="lt1"/>
+      </a:solidFill>
+      <a:ln>
+        <a:solidFill>
+          <a:schemeClr val="dk1">
+            <a:lumMod val="25000"/>
+            <a:lumOff val="75000"/>
+          </a:schemeClr>
+        </a:solidFill>
+      </a:ln>
+    </cs:spPr>
+    <cs:defRPr sz="1197" kern="1200"/>
+    <cs:bodyPr rot="0" spcFirstLastPara="1" vertOverflow="clip" horzOverflow="clip" vert="horz" wrap="square" lIns="36576" tIns="18288" rIns="36576" bIns="18288" anchor="ctr" anchorCtr="1">
+      <a:spAutoFit/>
+    </cs:bodyPr>
+  </cs:dataLabelCallout>
+  <cs:dataPoint>
+    <cs:lnRef idx="0"/>
+    <cs:fillRef idx="0">
+      <cs:styleClr val="auto"/>
+    </cs:fillRef>
+    <cs:effectRef idx="0"/>
+    <cs:fontRef idx="minor">
+      <a:schemeClr val="dk1"/>
+    </cs:fontRef>
+    <cs:spPr>
+      <a:solidFill>
+        <a:schemeClr val="phClr"/>
+      </a:solidFill>
+    </cs:spPr>
+  </cs:dataPoint>
+  <cs:dataPoint3D>
+    <cs:lnRef idx="0"/>
+    <cs:fillRef idx="0">
+      <cs:styleClr val="auto"/>
+    </cs:fillRef>
+    <cs:effectRef idx="0"/>
+    <cs:fontRef idx="minor">
+      <a:schemeClr val="dk1"/>
+    </cs:fontRef>
+    <cs:spPr>
+      <a:solidFill>
+        <a:schemeClr val="phClr"/>
+      </a:solidFill>
+    </cs:spPr>
+  </cs:dataPoint3D>
+  <cs:dataPointLine>
+    <cs:lnRef idx="0">
+      <cs:styleClr val="auto"/>
+    </cs:lnRef>
+    <cs:fillRef idx="0"/>
+    <cs:effectRef idx="0"/>
+    <cs:fontRef idx="minor">
+      <a:schemeClr val="dk1"/>
+    </cs:fontRef>
+    <cs:spPr>
+      <a:ln w="22225" cap="rnd">
+        <a:solidFill>
+          <a:schemeClr val="phClr"/>
+        </a:solidFill>
+        <a:round/>
+      </a:ln>
+    </cs:spPr>
+  </cs:dataPointLine>
+  <cs:dataPointMarker>
+    <cs:lnRef idx="0">
+      <cs:styleClr val="auto"/>
+    </cs:lnRef>
+    <cs:fillRef idx="0">
+      <cs:styleClr val="auto"/>
+    </cs:fillRef>
+    <cs:effectRef idx="0"/>
+    <cs:fontRef idx="minor">
+      <a:schemeClr val="dk1"/>
+    </cs:fontRef>
+    <cs:spPr>
+      <a:solidFill>
+        <a:schemeClr val="lt1"/>
+      </a:solidFill>
+      <a:ln w="15875">
+        <a:solidFill>
+          <a:schemeClr val="phClr"/>
+        </a:solidFill>
+        <a:round/>
+      </a:ln>
+    </cs:spPr>
+  </cs:dataPointMarker>
+  <cs:dataPointMarkerLayout symbol="circle" size="6"/>
+  <cs:dataPointWireframe>
+    <cs:lnRef idx="0">
+      <cs:styleClr val="auto"/>
+    </cs:lnRef>
+    <cs:fillRef idx="0"/>
+    <cs:effectRef idx="0"/>
+    <cs:fontRef idx="minor">
+      <a:schemeClr val="dk1"/>
+    </cs:fontRef>
+    <cs:spPr>
+      <a:ln w="9525" cap="rnd">
+        <a:solidFill>
+          <a:schemeClr val="phClr"/>
+        </a:solidFill>
+        <a:round/>
+      </a:ln>
+    </cs:spPr>
+  </cs:dataPointWireframe>
+  <cs:dataTable>
+    <cs:lnRef idx="0"/>
+    <cs:fillRef idx="0"/>
+    <cs:effectRef idx="0"/>
+    <cs:fontRef idx="minor">
+      <a:schemeClr val="dk1">
+        <a:lumMod val="65000"/>
+        <a:lumOff val="35000"/>
+      </a:schemeClr>
+    </cs:fontRef>
+    <cs:spPr>
+      <a:ln w="9525" cap="flat" cmpd="sng" algn="ctr">
+        <a:solidFill>
+          <a:schemeClr val="dk1">
+            <a:lumMod val="15000"/>
+            <a:lumOff val="85000"/>
+          </a:schemeClr>
+        </a:solidFill>
+        <a:round/>
+      </a:ln>
+    </cs:spPr>
+    <cs:defRPr sz="1064" kern="1200"/>
+  </cs:dataTable>
+  <cs:downBar>
+    <cs:lnRef idx="0"/>
+    <cs:fillRef idx="0"/>
+    <cs:effectRef idx="0"/>
+    <cs:fontRef idx="minor">
+      <a:schemeClr val="dk1"/>
+    </cs:fontRef>
+    <cs:spPr>
+      <a:solidFill>
+        <a:schemeClr val="dk1">
+          <a:lumMod val="75000"/>
+          <a:lumOff val="25000"/>
+        </a:schemeClr>
+      </a:solidFill>
+      <a:ln w="9525" cap="flat" cmpd="sng" algn="ctr">
+        <a:solidFill>
+          <a:schemeClr val="dk1">
+            <a:lumMod val="50000"/>
+            <a:lumOff val="50000"/>
+          </a:schemeClr>
+        </a:solidFill>
+        <a:round/>
+      </a:ln>
+    </cs:spPr>
+  </cs:downBar>
+  <cs:dropLine>
+    <cs:lnRef idx="0"/>
+    <cs:fillRef idx="0"/>
+    <cs:effectRef idx="0"/>
+    <cs:fontRef idx="minor">
+      <a:schemeClr val="dk1"/>
+    </cs:fontRef>
+    <cs:spPr>
+      <a:ln w="9525" cap="flat" cmpd="sng" algn="ctr">
+        <a:solidFill>
+          <a:schemeClr val="dk1">
+            <a:lumMod val="35000"/>
+            <a:lumOff val="65000"/>
+          </a:schemeClr>
+        </a:solidFill>
+        <a:round/>
+      </a:ln>
+    </cs:spPr>
+  </cs:dropLine>
+  <cs:errorBar>
+    <cs:lnRef idx="0"/>
+    <cs:fillRef idx="0"/>
+    <cs:effectRef idx="0"/>
+    <cs:fontRef idx="minor">
+      <a:schemeClr val="dk1"/>
+    </cs:fontRef>
+    <cs:spPr>
+      <a:ln w="9525" cap="flat" cmpd="sng" algn="ctr">
+        <a:solidFill>
+          <a:schemeClr val="dk1">
+            <a:lumMod val="50000"/>
+            <a:lumOff val="50000"/>
+          </a:schemeClr>
+        </a:solidFill>
+        <a:round/>
+      </a:ln>
+    </cs:spPr>
+  </cs:errorBar>
+  <cs:floor>
+    <cs:lnRef idx="0"/>
+    <cs:fillRef idx="0"/>
+    <cs:effectRef idx="0"/>
+    <cs:fontRef idx="minor">
+      <a:schemeClr val="dk1"/>
+    </cs:fontRef>
+    <cs:spPr>
+      <a:pattFill prst="ltDnDiag">
+        <a:fgClr>
+          <a:schemeClr val="dk1">
+            <a:lumMod val="15000"/>
+            <a:lumOff val="85000"/>
+          </a:schemeClr>
+        </a:fgClr>
+        <a:bgClr>
+          <a:schemeClr val="lt1"/>
+        </a:bgClr>
+      </a:pattFill>
+    </cs:spPr>
+  </cs:floor>
+  <cs:gridlineMajor>
+    <cs:lnRef idx="0"/>
+    <cs:fillRef idx="0"/>
+    <cs:effectRef idx="0"/>
+    <cs:fontRef idx="minor">
+      <a:schemeClr val="dk1"/>
+    </cs:fontRef>
+    <cs:spPr>
+      <a:ln w="9525" cap="flat" cmpd="sng" algn="ctr">
+        <a:solidFill>
+          <a:schemeClr val="dk1">
+            <a:lumMod val="15000"/>
+            <a:lumOff val="85000"/>
+            <a:alpha val="54000"/>
+          </a:schemeClr>
+        </a:solidFill>
+        <a:round/>
+      </a:ln>
+    </cs:spPr>
+  </cs:gridlineMajor>
+  <cs:gridlineMinor>
+    <cs:lnRef idx="0"/>
+    <cs:fillRef idx="0"/>
+    <cs:effectRef idx="0"/>
+    <cs:fontRef idx="minor">
+      <a:schemeClr val="dk1"/>
+    </cs:fontRef>
+    <cs:spPr>
+      <a:ln w="9525" cap="flat" cmpd="sng" algn="ctr">
+        <a:solidFill>
+          <a:schemeClr val="dk1">
+            <a:lumMod val="15000"/>
+            <a:lumOff val="85000"/>
+            <a:alpha val="51000"/>
+          </a:schemeClr>
+        </a:solidFill>
+        <a:round/>
+      </a:ln>
+    </cs:spPr>
+  </cs:gridlineMinor>
+  <cs:hiLoLine>
+    <cs:lnRef idx="0"/>
+    <cs:fillRef idx="0"/>
+    <cs:effectRef idx="0"/>
+    <cs:fontRef idx="minor">
+      <a:schemeClr val="dk1"/>
+    </cs:fontRef>
+    <cs:spPr>
+      <a:ln w="9525" cap="flat" cmpd="sng" algn="ctr">
+        <a:solidFill>
+          <a:schemeClr val="dk1">
+            <a:lumMod val="35000"/>
+            <a:lumOff val="65000"/>
+          </a:schemeClr>
+        </a:solidFill>
+        <a:round/>
+      </a:ln>
+    </cs:spPr>
+  </cs:hiLoLine>
+  <cs:leaderLine>
+    <cs:lnRef idx="0"/>
+    <cs:fillRef idx="0"/>
+    <cs:effectRef idx="0"/>
+    <cs:fontRef idx="minor">
+      <a:schemeClr val="dk1"/>
+    </cs:fontRef>
+    <cs:spPr>
+      <a:ln w="9525" cap="flat" cmpd="sng" algn="ctr">
+        <a:solidFill>
+          <a:schemeClr val="dk1">
+            <a:lumMod val="35000"/>
+            <a:lumOff val="65000"/>
+          </a:schemeClr>
+        </a:solidFill>
+        <a:round/>
+      </a:ln>
+    </cs:spPr>
+  </cs:leaderLine>
+  <cs:legend>
+    <cs:lnRef idx="0"/>
+    <cs:fillRef idx="0"/>
+    <cs:effectRef idx="0"/>
+    <cs:fontRef idx="minor">
+      <a:schemeClr val="dk1">
+        <a:lumMod val="65000"/>
+        <a:lumOff val="35000"/>
+      </a:schemeClr>
+    </cs:fontRef>
+    <cs:defRPr sz="1197" kern="1200"/>
+  </cs:legend>
+  <cs:plotArea>
+    <cs:lnRef idx="0"/>
+    <cs:fillRef idx="0"/>
+    <cs:effectRef idx="0"/>
+    <cs:fontRef idx="minor">
+      <a:schemeClr val="dk1"/>
+    </cs:fontRef>
+    <cs:spPr>
+      <a:pattFill prst="ltDnDiag">
+        <a:fgClr>
+          <a:schemeClr val="dk1">
+            <a:lumMod val="15000"/>
+            <a:lumOff val="85000"/>
+          </a:schemeClr>
+        </a:fgClr>
+        <a:bgClr>
+          <a:schemeClr val="lt1"/>
+        </a:bgClr>
+      </a:pattFill>
+    </cs:spPr>
+  </cs:plotArea>
+  <cs:plotArea3D>
+    <cs:lnRef idx="0"/>
+    <cs:fillRef idx="0"/>
+    <cs:effectRef idx="0"/>
+    <cs:fontRef idx="minor">
+      <a:schemeClr val="dk1"/>
+    </cs:fontRef>
+    <cs:spPr>
+      <a:solidFill>
+        <a:schemeClr val="lt1"/>
+      </a:solidFill>
+    </cs:spPr>
+  </cs:plotArea3D>
+  <cs:seriesAxis>
+    <cs:lnRef idx="0"/>
+    <cs:fillRef idx="0"/>
+    <cs:effectRef idx="0"/>
+    <cs:fontRef idx="minor">
+      <a:schemeClr val="dk1">
+        <a:lumMod val="65000"/>
+        <a:lumOff val="35000"/>
+      </a:schemeClr>
+    </cs:fontRef>
+    <cs:defRPr sz="1197" kern="1200"/>
+  </cs:seriesAxis>
+  <cs:seriesLine>
+    <cs:lnRef idx="0"/>
+    <cs:fillRef idx="0"/>
+    <cs:effectRef idx="0"/>
+    <cs:fontRef idx="minor">
+      <a:schemeClr val="dk1"/>
+    </cs:fontRef>
+    <cs:spPr>
+      <a:ln w="9525" cap="flat" cmpd="sng" algn="ctr">
+        <a:solidFill>
+          <a:schemeClr val="dk1">
+            <a:lumMod val="35000"/>
+            <a:lumOff val="65000"/>
+          </a:schemeClr>
+        </a:solidFill>
+        <a:round/>
+      </a:ln>
+    </cs:spPr>
+  </cs:seriesLine>
+  <cs:title>
+    <cs:lnRef idx="0"/>
+    <cs:fillRef idx="0"/>
+    <cs:effectRef idx="0"/>
+    <cs:fontRef idx="major">
+      <a:schemeClr val="dk1">
+        <a:lumMod val="50000"/>
+        <a:lumOff val="50000"/>
+      </a:schemeClr>
+    </cs:fontRef>
+    <cs:defRPr sz="2128" b="1" kern="1200" cap="none" spc="0" normalizeH="0" baseline="0"/>
+  </cs:title>
+  <cs:trendline>
+    <cs:lnRef idx="0">
+      <cs:styleClr val="auto"/>
+    </cs:lnRef>
+    <cs:fillRef idx="0"/>
+    <cs:effectRef idx="0"/>
+    <cs:fontRef idx="minor">
+      <a:schemeClr val="dk1"/>
+    </cs:fontRef>
+    <cs:spPr>
+      <a:ln w="19050" cap="rnd">
+        <a:solidFill>
+          <a:schemeClr val="phClr"/>
+        </a:solidFill>
+      </a:ln>
+    </cs:spPr>
+  </cs:trendline>
+  <cs:trendlineLabel>
+    <cs:lnRef idx="0"/>
+    <cs:fillRef idx="0"/>
+    <cs:effectRef idx="0"/>
+    <cs:fontRef idx="minor">
+      <a:schemeClr val="dk1">
+        <a:lumMod val="65000"/>
+        <a:lumOff val="35000"/>
+      </a:schemeClr>
+    </cs:fontRef>
+    <cs:defRPr sz="1197" kern="1200"/>
+  </cs:trendlineLabel>
+  <cs:upBar>
+    <cs:lnRef idx="0"/>
+    <cs:fillRef idx="0"/>
+    <cs:effectRef idx="0"/>
+    <cs:fontRef idx="minor">
+      <a:schemeClr val="dk1"/>
+    </cs:fontRef>
+    <cs:spPr>
+      <a:solidFill>
+        <a:schemeClr val="lt1"/>
+      </a:solidFill>
+      <a:ln w="9525" cap="flat" cmpd="sng" algn="ctr">
+        <a:solidFill>
+          <a:schemeClr val="dk1">
+            <a:lumMod val="50000"/>
+            <a:lumOff val="50000"/>
+          </a:schemeClr>
+        </a:solidFill>
+        <a:round/>
+      </a:ln>
+    </cs:spPr>
+  </cs:upBar>
+  <cs:valueAxis>
+    <cs:lnRef idx="0"/>
+    <cs:fillRef idx="0"/>
+    <cs:effectRef idx="0"/>
+    <cs:fontRef idx="minor">
+      <a:schemeClr val="dk1">
+        <a:lumMod val="65000"/>
+        <a:lumOff val="35000"/>
+      </a:schemeClr>
+    </cs:fontRef>
+    <cs:defRPr sz="1197" kern="1200"/>
+  </cs:valueAxis>
+  <cs:wall>
+    <cs:lnRef idx="0"/>
+    <cs:fillRef idx="0"/>
+    <cs:effectRef idx="0"/>
+    <cs:fontRef idx="minor">
+      <a:schemeClr val="dk1"/>
+    </cs:fontRef>
+    <cs:spPr>
+      <a:pattFill prst="ltDnDiag">
+        <a:fgClr>
+          <a:schemeClr val="dk1">
+            <a:lumMod val="15000"/>
+            <a:lumOff val="85000"/>
+          </a:schemeClr>
+        </a:fgClr>
+        <a:bgClr>
+          <a:schemeClr val="lt1"/>
+        </a:bgClr>
+      </a:pattFill>
+    </cs:spPr>
+  </cs:wall>
+</cs:chartStyle>
+</file>
+
 <file path=ppt/slideLayouts/slideLayout1.xml><?xml version="1.0" encoding="utf-8"?>
 <p:sldLayout xmlns:a="http://schemas.openxmlformats.org/drawingml/2006/main" xmlns:r="http://schemas.openxmlformats.org/officeDocument/2006/relationships" xmlns:p="http://schemas.openxmlformats.org/presentationml/2006/main" type="title" preserve="1">
   <p:cSld name="Diapositiva titolo">
@@ -328,7 +2601,7 @@
             <a:fld id="{B61BEF0D-F0BB-DE4B-95CE-6DB70DBA9567}" type="datetimeFigureOut">
               <a:rPr lang="en-US" smtClean="0"/>
               <a:pPr/>
-              <a:t>10/14/2017</a:t>
+              <a:t>10/28/2017</a:t>
             </a:fld>
             <a:endParaRPr lang="en-US" dirty="0"/>
           </a:p>
@@ -668,7 +2941,7 @@
             <a:fld id="{B61BEF0D-F0BB-DE4B-95CE-6DB70DBA9567}" type="datetimeFigureOut">
               <a:rPr lang="en-US" smtClean="0"/>
               <a:pPr/>
-              <a:t>10/14/2017</a:t>
+              <a:t>10/28/2017</a:t>
             </a:fld>
             <a:endParaRPr lang="en-US" dirty="0"/>
           </a:p>
@@ -1071,7 +3344,7 @@
             <a:fld id="{B61BEF0D-F0BB-DE4B-95CE-6DB70DBA9567}" type="datetimeFigureOut">
               <a:rPr lang="en-US" smtClean="0"/>
               <a:pPr/>
-              <a:t>10/14/2017</a:t>
+              <a:t>10/28/2017</a:t>
             </a:fld>
             <a:endParaRPr lang="en-US" dirty="0"/>
           </a:p>
@@ -1408,7 +3681,7 @@
             <a:fld id="{B61BEF0D-F0BB-DE4B-95CE-6DB70DBA9567}" type="datetimeFigureOut">
               <a:rPr lang="en-US" smtClean="0"/>
               <a:pPr/>
-              <a:t>10/14/2017</a:t>
+              <a:t>10/28/2017</a:t>
             </a:fld>
             <a:endParaRPr lang="en-US" dirty="0"/>
           </a:p>
@@ -1730,7 +4003,7 @@
             <a:fld id="{B61BEF0D-F0BB-DE4B-95CE-6DB70DBA9567}" type="datetimeFigureOut">
               <a:rPr lang="en-US" smtClean="0"/>
               <a:pPr/>
-              <a:t>10/14/2017</a:t>
+              <a:t>10/28/2017</a:t>
             </a:fld>
             <a:endParaRPr lang="en-US" dirty="0"/>
           </a:p>
@@ -2128,7 +4401,7 @@
             <a:fld id="{B61BEF0D-F0BB-DE4B-95CE-6DB70DBA9567}" type="datetimeFigureOut">
               <a:rPr lang="en-US" smtClean="0"/>
               <a:pPr/>
-              <a:t>10/14/2017</a:t>
+              <a:t>10/28/2017</a:t>
             </a:fld>
             <a:endParaRPr lang="en-US" dirty="0"/>
           </a:p>
@@ -2387,7 +4660,7 @@
             <a:fld id="{B61BEF0D-F0BB-DE4B-95CE-6DB70DBA9567}" type="datetimeFigureOut">
               <a:rPr lang="en-US" smtClean="0"/>
               <a:pPr/>
-              <a:t>10/14/2017</a:t>
+              <a:t>10/28/2017</a:t>
             </a:fld>
             <a:endParaRPr lang="en-US" dirty="0"/>
           </a:p>
@@ -2651,7 +4924,7 @@
             <a:fld id="{B61BEF0D-F0BB-DE4B-95CE-6DB70DBA9567}" type="datetimeFigureOut">
               <a:rPr lang="en-US" smtClean="0"/>
               <a:pPr/>
-              <a:t>10/14/2017</a:t>
+              <a:t>10/28/2017</a:t>
             </a:fld>
             <a:endParaRPr lang="en-US" dirty="0"/>
           </a:p>
@@ -2915,7 +5188,7 @@
             <a:fld id="{B61BEF0D-F0BB-DE4B-95CE-6DB70DBA9567}" type="datetimeFigureOut">
               <a:rPr lang="en-US" smtClean="0"/>
               <a:pPr/>
-              <a:t>10/14/2017</a:t>
+              <a:t>10/28/2017</a:t>
             </a:fld>
             <a:endParaRPr lang="en-US" dirty="0"/>
           </a:p>
@@ -3246,7 +5519,7 @@
             <a:fld id="{B61BEF0D-F0BB-DE4B-95CE-6DB70DBA9567}" type="datetimeFigureOut">
               <a:rPr lang="en-US" smtClean="0"/>
               <a:pPr/>
-              <a:t>10/14/2017</a:t>
+              <a:t>10/28/2017</a:t>
             </a:fld>
             <a:endParaRPr lang="en-US" dirty="0"/>
           </a:p>
@@ -3571,7 +5844,7 @@
             <a:fld id="{B61BEF0D-F0BB-DE4B-95CE-6DB70DBA9567}" type="datetimeFigureOut">
               <a:rPr lang="en-US" smtClean="0"/>
               <a:pPr/>
-              <a:t>10/14/2017</a:t>
+              <a:t>10/28/2017</a:t>
             </a:fld>
             <a:endParaRPr lang="en-US" dirty="0"/>
           </a:p>
@@ -4030,7 +6303,7 @@
             <a:fld id="{B61BEF0D-F0BB-DE4B-95CE-6DB70DBA9567}" type="datetimeFigureOut">
               <a:rPr lang="en-US" smtClean="0"/>
               <a:pPr/>
-              <a:t>10/14/2017</a:t>
+              <a:t>10/28/2017</a:t>
             </a:fld>
             <a:endParaRPr lang="en-US" dirty="0"/>
           </a:p>
@@ -4237,7 +6510,7 @@
             <a:fld id="{B61BEF0D-F0BB-DE4B-95CE-6DB70DBA9567}" type="datetimeFigureOut">
               <a:rPr lang="en-US" smtClean="0"/>
               <a:pPr/>
-              <a:t>10/14/2017</a:t>
+              <a:t>10/28/2017</a:t>
             </a:fld>
             <a:endParaRPr lang="en-US" dirty="0"/>
           </a:p>
@@ -4416,7 +6689,7 @@
             <a:fld id="{B61BEF0D-F0BB-DE4B-95CE-6DB70DBA9567}" type="datetimeFigureOut">
               <a:rPr lang="en-US" smtClean="0"/>
               <a:pPr/>
-              <a:t>10/14/2017</a:t>
+              <a:t>10/28/2017</a:t>
             </a:fld>
             <a:endParaRPr lang="en-US" dirty="0"/>
           </a:p>
@@ -4751,7 +7024,7 @@
             <a:fld id="{B61BEF0D-F0BB-DE4B-95CE-6DB70DBA9567}" type="datetimeFigureOut">
               <a:rPr lang="en-US" smtClean="0"/>
               <a:pPr/>
-              <a:t>10/14/2017</a:t>
+              <a:t>10/28/2017</a:t>
             </a:fld>
             <a:endParaRPr lang="en-US" dirty="0"/>
           </a:p>
@@ -5098,7 +7371,7 @@
             <a:fld id="{B61BEF0D-F0BB-DE4B-95CE-6DB70DBA9567}" type="datetimeFigureOut">
               <a:rPr lang="en-US" smtClean="0"/>
               <a:pPr/>
-              <a:t>10/14/2017</a:t>
+              <a:t>10/28/2017</a:t>
             </a:fld>
             <a:endParaRPr lang="en-US" dirty="0"/>
           </a:p>
@@ -7217,7 +9490,7 @@
             <a:fld id="{B61BEF0D-F0BB-DE4B-95CE-6DB70DBA9567}" type="datetimeFigureOut">
               <a:rPr lang="en-US" smtClean="0"/>
               <a:pPr/>
-              <a:t>10/14/2017</a:t>
+              <a:t>10/28/2017</a:t>
             </a:fld>
             <a:endParaRPr lang="en-US" dirty="0"/>
           </a:p>
@@ -8477,10 +10750,9 @@
           <a:lstStyle/>
           <a:p>
             <a:r>
-              <a:rPr lang="it-IT" dirty="0" err="1"/>
-              <a:t>Parser</a:t>
-            </a:r>
-            <a:endParaRPr lang="it-IT" dirty="0"/>
+              <a:rPr lang="it-IT" dirty="0"/>
+              <a:t>Program option</a:t>
+            </a:r>
           </a:p>
           <a:p>
             <a:pPr marL="457200" lvl="1" indent="0">
@@ -8493,6 +10765,432 @@
               <a:buNone/>
             </a:pPr>
             <a:endParaRPr lang="it-IT" dirty="0"/>
+          </a:p>
+        </p:txBody>
+      </p:sp>
+      <p:pic>
+        <p:nvPicPr>
+          <p:cNvPr id="3" name="Immagine 2">
+            <a:extLst>
+              <a:ext uri="{FF2B5EF4-FFF2-40B4-BE49-F238E27FC236}">
+                <a16:creationId xmlns:a16="http://schemas.microsoft.com/office/drawing/2014/main" id="{8362CBD8-08AF-4858-84AC-5E1FEA6ABB4C}"/>
+              </a:ext>
+            </a:extLst>
+          </p:cNvPr>
+          <p:cNvPicPr>
+            <a:picLocks noChangeAspect="1"/>
+          </p:cNvPicPr>
+          <p:nvPr/>
+        </p:nvPicPr>
+        <p:blipFill>
+          <a:blip r:embed="rId2"/>
+          <a:stretch>
+            <a:fillRect/>
+          </a:stretch>
+        </p:blipFill>
+        <p:spPr>
+          <a:xfrm>
+            <a:off x="2497016" y="2356338"/>
+            <a:ext cx="8317626" cy="2101361"/>
+          </a:xfrm>
+          <a:prstGeom prst="rect">
+            <a:avLst/>
+          </a:prstGeom>
+        </p:spPr>
+      </p:pic>
+      <p:sp>
+        <p:nvSpPr>
+          <p:cNvPr id="5" name="CasellaDiTesto 4">
+            <a:extLst>
+              <a:ext uri="{FF2B5EF4-FFF2-40B4-BE49-F238E27FC236}">
+                <a16:creationId xmlns:a16="http://schemas.microsoft.com/office/drawing/2014/main" id="{EA68C5D8-4703-4BF6-8E65-64CF4A8A89BC}"/>
+              </a:ext>
+            </a:extLst>
+          </p:cNvPr>
+          <p:cNvSpPr txBox="1"/>
+          <p:nvPr/>
+        </p:nvSpPr>
+        <p:spPr>
+          <a:xfrm>
+            <a:off x="2497016" y="4696222"/>
+            <a:ext cx="8656149" cy="1323439"/>
+          </a:xfrm>
+          <a:prstGeom prst="rect">
+            <a:avLst/>
+          </a:prstGeom>
+          <a:noFill/>
+        </p:spPr>
+        <p:txBody>
+          <a:bodyPr wrap="square" rtlCol="0">
+            <a:spAutoFit/>
+          </a:bodyPr>
+          <a:lstStyle/>
+          <a:p>
+            <a:r>
+              <a:rPr lang="it-IT" sz="1600" dirty="0">
+                <a:solidFill>
+                  <a:schemeClr val="tx1">
+                    <a:lumMod val="75000"/>
+                    <a:lumOff val="25000"/>
+                  </a:schemeClr>
+                </a:solidFill>
+              </a:rPr>
+              <a:t>Program options </a:t>
+            </a:r>
+            <a:r>
+              <a:rPr lang="it-IT" sz="1600" dirty="0" err="1">
+                <a:solidFill>
+                  <a:schemeClr val="tx1">
+                    <a:lumMod val="75000"/>
+                    <a:lumOff val="25000"/>
+                  </a:schemeClr>
+                </a:solidFill>
+              </a:rPr>
+              <a:t>let</a:t>
+            </a:r>
+            <a:r>
+              <a:rPr lang="it-IT" sz="1600" dirty="0">
+                <a:solidFill>
+                  <a:schemeClr val="tx1">
+                    <a:lumMod val="75000"/>
+                    <a:lumOff val="25000"/>
+                  </a:schemeClr>
+                </a:solidFill>
+              </a:rPr>
+              <a:t> user set the </a:t>
+            </a:r>
+            <a:r>
+              <a:rPr lang="it-IT" sz="1600" dirty="0" err="1">
+                <a:solidFill>
+                  <a:schemeClr val="tx1">
+                    <a:lumMod val="75000"/>
+                    <a:lumOff val="25000"/>
+                  </a:schemeClr>
+                </a:solidFill>
+              </a:rPr>
+              <a:t>following</a:t>
+            </a:r>
+            <a:r>
+              <a:rPr lang="it-IT" sz="1600" dirty="0">
+                <a:solidFill>
+                  <a:schemeClr val="tx1">
+                    <a:lumMod val="75000"/>
+                    <a:lumOff val="25000"/>
+                  </a:schemeClr>
+                </a:solidFill>
+              </a:rPr>
+              <a:t> </a:t>
+            </a:r>
+            <a:r>
+              <a:rPr lang="it-IT" sz="1600" dirty="0" err="1">
+                <a:solidFill>
+                  <a:schemeClr val="tx1">
+                    <a:lumMod val="75000"/>
+                    <a:lumOff val="25000"/>
+                  </a:schemeClr>
+                </a:solidFill>
+              </a:rPr>
+              <a:t>parameters</a:t>
+            </a:r>
+            <a:r>
+              <a:rPr lang="it-IT" sz="1600" dirty="0">
+                <a:solidFill>
+                  <a:schemeClr val="tx1">
+                    <a:lumMod val="75000"/>
+                    <a:lumOff val="25000"/>
+                  </a:schemeClr>
+                </a:solidFill>
+              </a:rPr>
+              <a:t> </a:t>
+            </a:r>
+            <a:r>
+              <a:rPr lang="it-IT" sz="1600" dirty="0" err="1">
+                <a:solidFill>
+                  <a:schemeClr val="tx1">
+                    <a:lumMod val="75000"/>
+                    <a:lumOff val="25000"/>
+                  </a:schemeClr>
+                </a:solidFill>
+              </a:rPr>
+              <a:t>at</a:t>
+            </a:r>
+            <a:r>
+              <a:rPr lang="it-IT" sz="1600" dirty="0">
+                <a:solidFill>
+                  <a:schemeClr val="tx1">
+                    <a:lumMod val="75000"/>
+                    <a:lumOff val="25000"/>
+                  </a:schemeClr>
+                </a:solidFill>
+              </a:rPr>
+              <a:t> </a:t>
+            </a:r>
+            <a:r>
+              <a:rPr lang="it-IT" sz="1600" dirty="0" err="1">
+                <a:solidFill>
+                  <a:schemeClr val="tx1">
+                    <a:lumMod val="75000"/>
+                    <a:lumOff val="25000"/>
+                  </a:schemeClr>
+                </a:solidFill>
+              </a:rPr>
+              <a:t>execution</a:t>
+            </a:r>
+            <a:r>
+              <a:rPr lang="it-IT" sz="1600" dirty="0">
+                <a:solidFill>
+                  <a:schemeClr val="tx1">
+                    <a:lumMod val="75000"/>
+                    <a:lumOff val="25000"/>
+                  </a:schemeClr>
+                </a:solidFill>
+              </a:rPr>
+              <a:t> time:</a:t>
+            </a:r>
+          </a:p>
+          <a:p>
+            <a:r>
+              <a:rPr lang="it-IT" sz="1600" b="1" dirty="0">
+                <a:solidFill>
+                  <a:schemeClr val="tx1">
+                    <a:lumMod val="75000"/>
+                    <a:lumOff val="25000"/>
+                  </a:schemeClr>
+                </a:solidFill>
+              </a:rPr>
+              <a:t>l</a:t>
+            </a:r>
+            <a:r>
+              <a:rPr lang="it-IT" sz="1600" dirty="0">
+                <a:solidFill>
+                  <a:schemeClr val="tx1">
+                    <a:lumMod val="75000"/>
+                    <a:lumOff val="25000"/>
+                  </a:schemeClr>
+                </a:solidFill>
+              </a:rPr>
+              <a:t>– </a:t>
+            </a:r>
+            <a:r>
+              <a:rPr lang="it-IT" sz="1600" dirty="0" err="1">
+                <a:solidFill>
+                  <a:schemeClr val="tx1">
+                    <a:lumMod val="75000"/>
+                    <a:lumOff val="25000"/>
+                  </a:schemeClr>
+                </a:solidFill>
+              </a:rPr>
+              <a:t>hash</a:t>
+            </a:r>
+            <a:r>
+              <a:rPr lang="it-IT" sz="1600" dirty="0">
+                <a:solidFill>
+                  <a:schemeClr val="tx1">
+                    <a:lumMod val="75000"/>
+                    <a:lumOff val="25000"/>
+                  </a:schemeClr>
+                </a:solidFill>
+              </a:rPr>
+              <a:t> </a:t>
+            </a:r>
+            <a:r>
+              <a:rPr lang="it-IT" sz="1600" dirty="0" err="1">
+                <a:solidFill>
+                  <a:schemeClr val="tx1">
+                    <a:lumMod val="75000"/>
+                    <a:lumOff val="25000"/>
+                  </a:schemeClr>
+                </a:solidFill>
+              </a:rPr>
+              <a:t>table</a:t>
+            </a:r>
+            <a:r>
+              <a:rPr lang="it-IT" sz="1600" dirty="0">
+                <a:solidFill>
+                  <a:schemeClr val="tx1">
+                    <a:lumMod val="75000"/>
+                    <a:lumOff val="25000"/>
+                  </a:schemeClr>
+                </a:solidFill>
+              </a:rPr>
+              <a:t> </a:t>
+            </a:r>
+            <a:r>
+              <a:rPr lang="it-IT" sz="1600" dirty="0" err="1">
+                <a:solidFill>
+                  <a:schemeClr val="tx1">
+                    <a:lumMod val="75000"/>
+                    <a:lumOff val="25000"/>
+                  </a:schemeClr>
+                </a:solidFill>
+              </a:rPr>
+              <a:t>lenght</a:t>
+            </a:r>
+            <a:endParaRPr lang="it-IT" sz="1600" dirty="0">
+              <a:solidFill>
+                <a:schemeClr val="tx1">
+                  <a:lumMod val="75000"/>
+                  <a:lumOff val="25000"/>
+                </a:schemeClr>
+              </a:solidFill>
+            </a:endParaRPr>
+          </a:p>
+          <a:p>
+            <a:r>
+              <a:rPr lang="it-IT" sz="1600" b="1" dirty="0">
+                <a:solidFill>
+                  <a:schemeClr val="tx1">
+                    <a:lumMod val="75000"/>
+                    <a:lumOff val="25000"/>
+                  </a:schemeClr>
+                </a:solidFill>
+              </a:rPr>
+              <a:t>t</a:t>
+            </a:r>
+            <a:r>
+              <a:rPr lang="it-IT" sz="1600" dirty="0">
+                <a:solidFill>
+                  <a:schemeClr val="tx1">
+                    <a:lumMod val="75000"/>
+                    <a:lumOff val="25000"/>
+                  </a:schemeClr>
+                </a:solidFill>
+              </a:rPr>
+              <a:t> – </a:t>
+            </a:r>
+            <a:r>
+              <a:rPr lang="it-IT" sz="1600" dirty="0" err="1">
+                <a:solidFill>
+                  <a:schemeClr val="tx1">
+                    <a:lumMod val="75000"/>
+                    <a:lumOff val="25000"/>
+                  </a:schemeClr>
+                </a:solidFill>
+              </a:rPr>
+              <a:t>number</a:t>
+            </a:r>
+            <a:r>
+              <a:rPr lang="it-IT" sz="1600" dirty="0">
+                <a:solidFill>
+                  <a:schemeClr val="tx1">
+                    <a:lumMod val="75000"/>
+                    <a:lumOff val="25000"/>
+                  </a:schemeClr>
+                </a:solidFill>
+              </a:rPr>
+              <a:t> of </a:t>
+            </a:r>
+            <a:r>
+              <a:rPr lang="it-IT" sz="1600" dirty="0" err="1">
+                <a:solidFill>
+                  <a:schemeClr val="tx1">
+                    <a:lumMod val="75000"/>
+                    <a:lumOff val="25000"/>
+                  </a:schemeClr>
+                </a:solidFill>
+              </a:rPr>
+              <a:t>thread</a:t>
+            </a:r>
+            <a:endParaRPr lang="it-IT" sz="1600" dirty="0">
+              <a:solidFill>
+                <a:schemeClr val="tx1">
+                  <a:lumMod val="75000"/>
+                  <a:lumOff val="25000"/>
+                </a:schemeClr>
+              </a:solidFill>
+            </a:endParaRPr>
+          </a:p>
+          <a:p>
+            <a:r>
+              <a:rPr lang="it-IT" sz="1600" b="1" dirty="0">
+                <a:solidFill>
+                  <a:schemeClr val="tx1">
+                    <a:lumMod val="75000"/>
+                    <a:lumOff val="25000"/>
+                  </a:schemeClr>
+                </a:solidFill>
+              </a:rPr>
+              <a:t>f </a:t>
+            </a:r>
+            <a:r>
+              <a:rPr lang="it-IT" sz="1600" dirty="0">
+                <a:solidFill>
+                  <a:schemeClr val="tx1">
+                    <a:lumMod val="75000"/>
+                    <a:lumOff val="25000"/>
+                  </a:schemeClr>
+                </a:solidFill>
+              </a:rPr>
+              <a:t>– source file</a:t>
+            </a:r>
+          </a:p>
+          <a:p>
+            <a:r>
+              <a:rPr lang="it-IT" sz="1600" b="1" dirty="0">
+                <a:solidFill>
+                  <a:schemeClr val="tx1">
+                    <a:lumMod val="75000"/>
+                    <a:lumOff val="25000"/>
+                  </a:schemeClr>
+                </a:solidFill>
+              </a:rPr>
+              <a:t>k</a:t>
+            </a:r>
+            <a:r>
+              <a:rPr lang="it-IT" sz="1600" dirty="0">
+                <a:solidFill>
+                  <a:schemeClr val="tx1">
+                    <a:lumMod val="75000"/>
+                    <a:lumOff val="25000"/>
+                  </a:schemeClr>
+                </a:solidFill>
+              </a:rPr>
+              <a:t> – k-</a:t>
+            </a:r>
+            <a:r>
+              <a:rPr lang="it-IT" sz="1600" dirty="0" err="1">
+                <a:solidFill>
+                  <a:schemeClr val="tx1">
+                    <a:lumMod val="75000"/>
+                    <a:lumOff val="25000"/>
+                  </a:schemeClr>
+                </a:solidFill>
+              </a:rPr>
+              <a:t>mer</a:t>
+            </a:r>
+            <a:r>
+              <a:rPr lang="it-IT" sz="1600" dirty="0">
+                <a:solidFill>
+                  <a:schemeClr val="tx1">
+                    <a:lumMod val="75000"/>
+                    <a:lumOff val="25000"/>
+                  </a:schemeClr>
+                </a:solidFill>
+              </a:rPr>
+              <a:t> </a:t>
+            </a:r>
+            <a:r>
+              <a:rPr lang="it-IT" sz="1600" dirty="0" err="1">
+                <a:solidFill>
+                  <a:schemeClr val="tx1">
+                    <a:lumMod val="75000"/>
+                    <a:lumOff val="25000"/>
+                  </a:schemeClr>
+                </a:solidFill>
+              </a:rPr>
+              <a:t>lenght</a:t>
+            </a:r>
+            <a:r>
+              <a:rPr lang="it-IT" sz="1600" dirty="0">
+                <a:solidFill>
+                  <a:schemeClr val="tx1">
+                    <a:lumMod val="75000"/>
+                    <a:lumOff val="25000"/>
+                  </a:schemeClr>
+                </a:solidFill>
+              </a:rPr>
+              <a:t>  </a:t>
+            </a:r>
           </a:p>
         </p:txBody>
       </p:sp>
@@ -13267,7 +15965,7 @@
                   <a:srgbClr val="FFC000"/>
                 </a:solidFill>
               </a:rPr>
-              <a:t>EVALUATION</a:t>
+              <a:t>TIME EVALUATION</a:t>
             </a:r>
             <a:endParaRPr lang="en-GB" sz="4400" dirty="0"/>
           </a:p>
@@ -13520,8 +16218,16 @@
           </a:lstStyle>
           <a:p>
             <a:r>
-              <a:rPr lang="it-IT"/>
-              <a:t>3 Version of the algorithm:</a:t>
+              <a:rPr lang="it-IT" dirty="0"/>
+              <a:t>3 Version of the </a:t>
+            </a:r>
+            <a:r>
+              <a:rPr lang="it-IT" dirty="0" err="1"/>
+              <a:t>algorithm</a:t>
+            </a:r>
+            <a:r>
+              <a:rPr lang="it-IT" dirty="0"/>
+              <a:t>:</a:t>
             </a:r>
           </a:p>
           <a:p>
@@ -13530,9 +16236,14 @@
               <a:buChar char="•"/>
             </a:pPr>
             <a:r>
-              <a:rPr lang="it-IT"/>
-              <a:t>Serial version</a:t>
-            </a:r>
+              <a:rPr lang="it-IT" dirty="0"/>
+              <a:t>Serial </a:t>
+            </a:r>
+            <a:r>
+              <a:rPr lang="it-IT" dirty="0" err="1"/>
+              <a:t>version</a:t>
+            </a:r>
+            <a:endParaRPr lang="it-IT" dirty="0"/>
           </a:p>
           <a:p>
             <a:pPr lvl="1">
@@ -13540,9 +16251,26 @@
               <a:buChar char="•"/>
             </a:pPr>
             <a:r>
-              <a:rPr lang="it-IT"/>
-              <a:t>Multithreaded hash-table with locks</a:t>
-            </a:r>
+              <a:rPr lang="it-IT" dirty="0" err="1"/>
+              <a:t>Multithreaded</a:t>
+            </a:r>
+            <a:r>
+              <a:rPr lang="it-IT" dirty="0"/>
+              <a:t> </a:t>
+            </a:r>
+            <a:r>
+              <a:rPr lang="it-IT" dirty="0" err="1"/>
+              <a:t>hash-table</a:t>
+            </a:r>
+            <a:r>
+              <a:rPr lang="it-IT" dirty="0"/>
+              <a:t> with </a:t>
+            </a:r>
+            <a:r>
+              <a:rPr lang="it-IT" dirty="0" err="1"/>
+              <a:t>locks</a:t>
+            </a:r>
+            <a:endParaRPr lang="it-IT" dirty="0"/>
           </a:p>
           <a:p>
             <a:pPr lvl="1">
@@ -13550,17 +16278,60 @@
               <a:buChar char="•"/>
             </a:pPr>
             <a:r>
-              <a:rPr lang="it-IT"/>
-              <a:t>Multithreaded hash-table without locks</a:t>
-            </a:r>
-          </a:p>
-          <a:p>
-            <a:endParaRPr lang="it-IT"/>
-          </a:p>
-          <a:p>
-            <a:r>
-              <a:rPr lang="it-IT"/>
-              <a:t>We want to:</a:t>
+              <a:rPr lang="it-IT" dirty="0" err="1"/>
+              <a:t>Multithreaded</a:t>
+            </a:r>
+            <a:r>
+              <a:rPr lang="it-IT" dirty="0"/>
+              <a:t> </a:t>
+            </a:r>
+            <a:r>
+              <a:rPr lang="it-IT" dirty="0" err="1"/>
+              <a:t>hash-table</a:t>
+            </a:r>
+            <a:r>
+              <a:rPr lang="it-IT" dirty="0"/>
+              <a:t> </a:t>
+            </a:r>
+            <a:r>
+              <a:rPr lang="it-IT" dirty="0" err="1"/>
+              <a:t>without</a:t>
+            </a:r>
+            <a:r>
+              <a:rPr lang="it-IT" dirty="0"/>
+              <a:t> </a:t>
+            </a:r>
+            <a:r>
+              <a:rPr lang="it-IT" dirty="0" err="1"/>
+              <a:t>locks</a:t>
+            </a:r>
+            <a:endParaRPr lang="it-IT" dirty="0"/>
+          </a:p>
+          <a:p>
+            <a:endParaRPr lang="it-IT" dirty="0"/>
+          </a:p>
+          <a:p>
+            <a:pPr marL="0" indent="0">
+              <a:buNone/>
+            </a:pPr>
+            <a:endParaRPr lang="it-IT" dirty="0"/>
+          </a:p>
+          <a:p>
+            <a:r>
+              <a:rPr lang="it-IT" dirty="0" err="1"/>
+              <a:t>We</a:t>
+            </a:r>
+            <a:r>
+              <a:rPr lang="it-IT" dirty="0"/>
+              <a:t> </a:t>
+            </a:r>
+            <a:r>
+              <a:rPr lang="it-IT" dirty="0" err="1"/>
+              <a:t>want</a:t>
+            </a:r>
+            <a:r>
+              <a:rPr lang="it-IT" dirty="0"/>
+              <a:t> to:</a:t>
             </a:r>
           </a:p>
           <a:p>
@@ -13569,9 +16340,30 @@
               <a:buChar char="•"/>
             </a:pPr>
             <a:r>
-              <a:rPr lang="it-IT"/>
-              <a:t>Show the speed up with respect to the number of threads</a:t>
-            </a:r>
+              <a:rPr lang="it-IT" dirty="0"/>
+              <a:t>Show the speed up with </a:t>
+            </a:r>
+            <a:r>
+              <a:rPr lang="it-IT" dirty="0" err="1"/>
+              <a:t>respect</a:t>
+            </a:r>
+            <a:r>
+              <a:rPr lang="it-IT" dirty="0"/>
+              <a:t> to the </a:t>
+            </a:r>
+            <a:r>
+              <a:rPr lang="it-IT" dirty="0" err="1"/>
+              <a:t>number</a:t>
+            </a:r>
+            <a:r>
+              <a:rPr lang="it-IT" dirty="0"/>
+              <a:t> of </a:t>
+            </a:r>
+            <a:r>
+              <a:rPr lang="it-IT" dirty="0" err="1"/>
+              <a:t>threads</a:t>
+            </a:r>
+            <a:endParaRPr lang="it-IT" dirty="0"/>
           </a:p>
           <a:p>
             <a:pPr lvl="1">
@@ -13579,32 +16371,66 @@
               <a:buChar char="•"/>
             </a:pPr>
             <a:r>
-              <a:rPr lang="it-IT"/>
-              <a:t>How much time it takes with respect to the lenght of the sequence</a:t>
-            </a:r>
-          </a:p>
-          <a:p>
-            <a:pPr lvl="1">
-              <a:buFont typeface="Arial" panose="020B0604020202020204" pitchFamily="34" charset="0"/>
-              <a:buChar char="•"/>
+              <a:rPr lang="it-IT" dirty="0"/>
+              <a:t>How </a:t>
+            </a:r>
+            <a:r>
+              <a:rPr lang="it-IT" dirty="0" err="1"/>
+              <a:t>much</a:t>
+            </a:r>
+            <a:r>
+              <a:rPr lang="it-IT" dirty="0"/>
+              <a:t> time </a:t>
+            </a:r>
+            <a:r>
+              <a:rPr lang="it-IT" dirty="0" err="1"/>
+              <a:t>it</a:t>
+            </a:r>
+            <a:r>
+              <a:rPr lang="it-IT" dirty="0"/>
+              <a:t> </a:t>
+            </a:r>
+            <a:r>
+              <a:rPr lang="it-IT" dirty="0" err="1"/>
+              <a:t>takes</a:t>
+            </a:r>
+            <a:r>
+              <a:rPr lang="it-IT" dirty="0"/>
+              <a:t> with </a:t>
+            </a:r>
+            <a:r>
+              <a:rPr lang="it-IT" dirty="0" err="1"/>
+              <a:t>respect</a:t>
+            </a:r>
+            <a:r>
+              <a:rPr lang="it-IT" dirty="0"/>
+              <a:t> to the </a:t>
+            </a:r>
+            <a:r>
+              <a:rPr lang="it-IT" dirty="0" err="1"/>
+              <a:t>lenght</a:t>
+            </a:r>
+            <a:r>
+              <a:rPr lang="it-IT" dirty="0"/>
+              <a:t> of the </a:t>
+            </a:r>
+            <a:r>
+              <a:rPr lang="it-IT" dirty="0" err="1"/>
+              <a:t>sequence</a:t>
+            </a:r>
+            <a:endParaRPr lang="it-IT" dirty="0"/>
+          </a:p>
+          <a:p>
+            <a:pPr marL="457200" lvl="1" indent="0">
+              <a:buNone/>
             </a:pPr>
-            <a:r>
-              <a:rPr lang="it-IT"/>
-              <a:t>How much memory is used with respect to the lenght of the sequence</a:t>
-            </a:r>
-          </a:p>
-          <a:p>
-            <a:pPr lvl="1">
-              <a:buFont typeface="Arial" panose="020B0604020202020204" pitchFamily="34" charset="0"/>
-              <a:buChar char="•"/>
-            </a:pPr>
-            <a:endParaRPr lang="it-IT"/>
-          </a:p>
-          <a:p>
-            <a:endParaRPr lang="it-IT"/>
-          </a:p>
-          <a:p>
-            <a:endParaRPr lang="it-IT"/>
+            <a:endParaRPr lang="it-IT" dirty="0"/>
+          </a:p>
+          <a:p>
+            <a:endParaRPr lang="it-IT" dirty="0"/>
+          </a:p>
+          <a:p>
+            <a:endParaRPr lang="it-IT" dirty="0"/>
           </a:p>
           <a:p>
             <a:pPr marL="457200" lvl="1" indent="0">
@@ -13677,43 +16503,124 @@
       </p:grpSpPr>
       <p:sp>
         <p:nvSpPr>
-          <p:cNvPr id="2" name="CasellaDiTesto 1">
+          <p:cNvPr id="5" name="Titolo 1">
             <a:extLst>
               <a:ext uri="{FF2B5EF4-FFF2-40B4-BE49-F238E27FC236}">
-                <a16:creationId xmlns:a16="http://schemas.microsoft.com/office/drawing/2014/main" id="{42D40A41-8082-4F8A-B4A5-E77F1A3BDD40}"/>
+                <a16:creationId xmlns:a16="http://schemas.microsoft.com/office/drawing/2014/main" id="{0C734ED3-9278-4126-AE51-FE48147C659D}"/>
               </a:ext>
             </a:extLst>
           </p:cNvPr>
-          <p:cNvSpPr txBox="1"/>
+          <p:cNvSpPr txBox="1">
+            <a:spLocks/>
+          </p:cNvSpPr>
           <p:nvPr/>
         </p:nvSpPr>
         <p:spPr>
           <a:xfrm>
-            <a:off x="5372100" y="1784838"/>
-            <a:ext cx="5706208" cy="369332"/>
+            <a:off x="1710861" y="632902"/>
+            <a:ext cx="8911687" cy="1280890"/>
           </a:xfrm>
           <a:prstGeom prst="rect">
             <a:avLst/>
           </a:prstGeom>
-          <a:noFill/>
         </p:spPr>
         <p:txBody>
-          <a:bodyPr wrap="square" rtlCol="0">
-            <a:spAutoFit/>
+          <a:bodyPr vert="horz" lIns="91440" tIns="45720" rIns="91440" bIns="45720" rtlCol="0" anchor="t">
+            <a:normAutofit/>
           </a:bodyPr>
-          <a:lstStyle/>
-          <a:p>
-            <a:r>
-              <a:rPr lang="it-IT" dirty="0"/>
-              <a:t>EVALUATION RESULT</a:t>
-            </a:r>
+          <a:lstStyle>
+            <a:lvl1pPr algn="l" defTabSz="457200" rtl="0" eaLnBrk="1" latinLnBrk="0" hangingPunct="1">
+              <a:spcBef>
+                <a:spcPct val="0"/>
+              </a:spcBef>
+              <a:buNone/>
+              <a:defRPr sz="3600" kern="1200">
+                <a:solidFill>
+                  <a:schemeClr val="tx1">
+                    <a:lumMod val="85000"/>
+                    <a:lumOff val="15000"/>
+                  </a:schemeClr>
+                </a:solidFill>
+                <a:latin typeface="+mj-lt"/>
+                <a:ea typeface="+mj-ea"/>
+                <a:cs typeface="+mj-cs"/>
+              </a:defRPr>
+            </a:lvl1pPr>
+            <a:lvl2pPr eaLnBrk="1" hangingPunct="1">
+              <a:defRPr>
+                <a:solidFill>
+                  <a:schemeClr val="tx2"/>
+                </a:solidFill>
+              </a:defRPr>
+            </a:lvl2pPr>
+            <a:lvl3pPr eaLnBrk="1" hangingPunct="1">
+              <a:defRPr>
+                <a:solidFill>
+                  <a:schemeClr val="tx2"/>
+                </a:solidFill>
+              </a:defRPr>
+            </a:lvl3pPr>
+            <a:lvl4pPr eaLnBrk="1" hangingPunct="1">
+              <a:defRPr>
+                <a:solidFill>
+                  <a:schemeClr val="tx2"/>
+                </a:solidFill>
+              </a:defRPr>
+            </a:lvl4pPr>
+            <a:lvl5pPr eaLnBrk="1" hangingPunct="1">
+              <a:defRPr>
+                <a:solidFill>
+                  <a:schemeClr val="tx2"/>
+                </a:solidFill>
+              </a:defRPr>
+            </a:lvl5pPr>
+            <a:lvl6pPr eaLnBrk="1" hangingPunct="1">
+              <a:defRPr>
+                <a:solidFill>
+                  <a:schemeClr val="tx2"/>
+                </a:solidFill>
+              </a:defRPr>
+            </a:lvl6pPr>
+            <a:lvl7pPr eaLnBrk="1" hangingPunct="1">
+              <a:defRPr>
+                <a:solidFill>
+                  <a:schemeClr val="tx2"/>
+                </a:solidFill>
+              </a:defRPr>
+            </a:lvl7pPr>
+            <a:lvl8pPr eaLnBrk="1" hangingPunct="1">
+              <a:defRPr>
+                <a:solidFill>
+                  <a:schemeClr val="tx2"/>
+                </a:solidFill>
+              </a:defRPr>
+            </a:lvl8pPr>
+            <a:lvl9pPr eaLnBrk="1" hangingPunct="1">
+              <a:defRPr>
+                <a:solidFill>
+                  <a:schemeClr val="tx2"/>
+                </a:solidFill>
+              </a:defRPr>
+            </a:lvl9pPr>
+          </a:lstStyle>
+          <a:p>
+            <a:pPr algn="ctr"/>
+            <a:r>
+              <a:rPr lang="it-IT" sz="4400" b="1" dirty="0">
+                <a:solidFill>
+                  <a:srgbClr val="FFC000"/>
+                </a:solidFill>
+              </a:rPr>
+              <a:t>DATASET</a:t>
+            </a:r>
+            <a:endParaRPr lang="en-GB" sz="4400" dirty="0"/>
           </a:p>
         </p:txBody>
       </p:sp>
     </p:spTree>
     <p:extLst>
       <p:ext uri="{BB962C8B-B14F-4D97-AF65-F5344CB8AC3E}">
-        <p14:creationId xmlns:p14="http://schemas.microsoft.com/office/powerpoint/2010/main" val="1589823522"/>
+        <p14:creationId xmlns:p14="http://schemas.microsoft.com/office/powerpoint/2010/main" val="457639041"/>
       </p:ext>
     </p:extLst>
   </p:cSld>
@@ -13742,39 +16649,1435 @@
       </p:grpSpPr>
       <p:sp>
         <p:nvSpPr>
-          <p:cNvPr id="4" name="CasellaDiTesto 3">
+          <p:cNvPr id="5" name="Titolo 1">
             <a:extLst>
               <a:ext uri="{FF2B5EF4-FFF2-40B4-BE49-F238E27FC236}">
-                <a16:creationId xmlns:a16="http://schemas.microsoft.com/office/drawing/2014/main" id="{2907761C-323D-4D83-A660-C336DCB8CA68}"/>
+                <a16:creationId xmlns:a16="http://schemas.microsoft.com/office/drawing/2014/main" id="{0C734ED3-9278-4126-AE51-FE48147C659D}"/>
               </a:ext>
             </a:extLst>
           </p:cNvPr>
-          <p:cNvSpPr txBox="1"/>
+          <p:cNvSpPr txBox="1">
+            <a:spLocks/>
+          </p:cNvSpPr>
           <p:nvPr/>
         </p:nvSpPr>
         <p:spPr>
           <a:xfrm>
-            <a:off x="4195664" y="4281854"/>
-            <a:ext cx="5706208" cy="646331"/>
+            <a:off x="1710861" y="632902"/>
+            <a:ext cx="8911687" cy="1280890"/>
           </a:xfrm>
           <a:prstGeom prst="rect">
             <a:avLst/>
           </a:prstGeom>
-          <a:noFill/>
         </p:spPr>
         <p:txBody>
-          <a:bodyPr wrap="square" rtlCol="0">
-            <a:spAutoFit/>
+          <a:bodyPr vert="horz" lIns="91440" tIns="45720" rIns="91440" bIns="45720" rtlCol="0" anchor="t">
+            <a:normAutofit/>
           </a:bodyPr>
-          <a:lstStyle/>
-          <a:p>
-            <a:r>
-              <a:rPr lang="it-IT" dirty="0"/>
+          <a:lstStyle>
+            <a:lvl1pPr algn="l" defTabSz="457200" rtl="0" eaLnBrk="1" latinLnBrk="0" hangingPunct="1">
+              <a:spcBef>
+                <a:spcPct val="0"/>
+              </a:spcBef>
+              <a:buNone/>
+              <a:defRPr sz="3600" kern="1200">
+                <a:solidFill>
+                  <a:schemeClr val="tx1">
+                    <a:lumMod val="85000"/>
+                    <a:lumOff val="15000"/>
+                  </a:schemeClr>
+                </a:solidFill>
+                <a:latin typeface="+mj-lt"/>
+                <a:ea typeface="+mj-ea"/>
+                <a:cs typeface="+mj-cs"/>
+              </a:defRPr>
+            </a:lvl1pPr>
+            <a:lvl2pPr eaLnBrk="1" hangingPunct="1">
+              <a:defRPr>
+                <a:solidFill>
+                  <a:schemeClr val="tx2"/>
+                </a:solidFill>
+              </a:defRPr>
+            </a:lvl2pPr>
+            <a:lvl3pPr eaLnBrk="1" hangingPunct="1">
+              <a:defRPr>
+                <a:solidFill>
+                  <a:schemeClr val="tx2"/>
+                </a:solidFill>
+              </a:defRPr>
+            </a:lvl3pPr>
+            <a:lvl4pPr eaLnBrk="1" hangingPunct="1">
+              <a:defRPr>
+                <a:solidFill>
+                  <a:schemeClr val="tx2"/>
+                </a:solidFill>
+              </a:defRPr>
+            </a:lvl4pPr>
+            <a:lvl5pPr eaLnBrk="1" hangingPunct="1">
+              <a:defRPr>
+                <a:solidFill>
+                  <a:schemeClr val="tx2"/>
+                </a:solidFill>
+              </a:defRPr>
+            </a:lvl5pPr>
+            <a:lvl6pPr eaLnBrk="1" hangingPunct="1">
+              <a:defRPr>
+                <a:solidFill>
+                  <a:schemeClr val="tx2"/>
+                </a:solidFill>
+              </a:defRPr>
+            </a:lvl6pPr>
+            <a:lvl7pPr eaLnBrk="1" hangingPunct="1">
+              <a:defRPr>
+                <a:solidFill>
+                  <a:schemeClr val="tx2"/>
+                </a:solidFill>
+              </a:defRPr>
+            </a:lvl7pPr>
+            <a:lvl8pPr eaLnBrk="1" hangingPunct="1">
+              <a:defRPr>
+                <a:solidFill>
+                  <a:schemeClr val="tx2"/>
+                </a:solidFill>
+              </a:defRPr>
+            </a:lvl8pPr>
+            <a:lvl9pPr eaLnBrk="1" hangingPunct="1">
+              <a:defRPr>
+                <a:solidFill>
+                  <a:schemeClr val="tx2"/>
+                </a:solidFill>
+              </a:defRPr>
+            </a:lvl9pPr>
+          </a:lstStyle>
+          <a:p>
+            <a:pPr algn="ctr"/>
+            <a:r>
+              <a:rPr lang="it-IT" sz="4400" b="1" dirty="0">
+                <a:solidFill>
+                  <a:srgbClr val="FFC000"/>
+                </a:solidFill>
+              </a:rPr>
+              <a:t>RESULT</a:t>
+            </a:r>
+            <a:endParaRPr lang="en-GB" sz="4400" dirty="0"/>
+          </a:p>
+        </p:txBody>
+      </p:sp>
+    </p:spTree>
+    <p:extLst>
+      <p:ext uri="{BB962C8B-B14F-4D97-AF65-F5344CB8AC3E}">
+        <p14:creationId xmlns:p14="http://schemas.microsoft.com/office/powerpoint/2010/main" val="4265149742"/>
+      </p:ext>
+    </p:extLst>
+  </p:cSld>
+  <p:clrMapOvr>
+    <a:masterClrMapping/>
+  </p:clrMapOvr>
+</p:sld>
+</file>
+
+<file path=ppt/slides/slide25.xml><?xml version="1.0" encoding="utf-8"?>
+<p:sld xmlns:a="http://schemas.openxmlformats.org/drawingml/2006/main" xmlns:r="http://schemas.openxmlformats.org/officeDocument/2006/relationships" xmlns:p="http://schemas.openxmlformats.org/presentationml/2006/main">
+  <p:cSld>
+    <p:spTree>
+      <p:nvGrpSpPr>
+        <p:cNvPr id="1" name=""/>
+        <p:cNvGrpSpPr/>
+        <p:nvPr/>
+      </p:nvGrpSpPr>
+      <p:grpSpPr>
+        <a:xfrm>
+          <a:off x="0" y="0"/>
+          <a:ext cx="0" cy="0"/>
+          <a:chOff x="0" y="0"/>
+          <a:chExt cx="0" cy="0"/>
+        </a:xfrm>
+      </p:grpSpPr>
+      <p:sp>
+        <p:nvSpPr>
+          <p:cNvPr id="5" name="Titolo 1">
+            <a:extLst>
+              <a:ext uri="{FF2B5EF4-FFF2-40B4-BE49-F238E27FC236}">
+                <a16:creationId xmlns:a16="http://schemas.microsoft.com/office/drawing/2014/main" id="{0C734ED3-9278-4126-AE51-FE48147C659D}"/>
+              </a:ext>
+            </a:extLst>
+          </p:cNvPr>
+          <p:cNvSpPr txBox="1">
+            <a:spLocks/>
+          </p:cNvSpPr>
+          <p:nvPr/>
+        </p:nvSpPr>
+        <p:spPr>
+          <a:xfrm>
+            <a:off x="1710861" y="632902"/>
+            <a:ext cx="8911687" cy="1280890"/>
+          </a:xfrm>
+          <a:prstGeom prst="rect">
+            <a:avLst/>
+          </a:prstGeom>
+        </p:spPr>
+        <p:txBody>
+          <a:bodyPr vert="horz" lIns="91440" tIns="45720" rIns="91440" bIns="45720" rtlCol="0" anchor="t">
+            <a:normAutofit/>
+          </a:bodyPr>
+          <a:lstStyle>
+            <a:lvl1pPr algn="l" defTabSz="457200" rtl="0" eaLnBrk="1" latinLnBrk="0" hangingPunct="1">
+              <a:spcBef>
+                <a:spcPct val="0"/>
+              </a:spcBef>
+              <a:buNone/>
+              <a:defRPr sz="3600" kern="1200">
+                <a:solidFill>
+                  <a:schemeClr val="tx1">
+                    <a:lumMod val="85000"/>
+                    <a:lumOff val="15000"/>
+                  </a:schemeClr>
+                </a:solidFill>
+                <a:latin typeface="+mj-lt"/>
+                <a:ea typeface="+mj-ea"/>
+                <a:cs typeface="+mj-cs"/>
+              </a:defRPr>
+            </a:lvl1pPr>
+            <a:lvl2pPr eaLnBrk="1" hangingPunct="1">
+              <a:defRPr>
+                <a:solidFill>
+                  <a:schemeClr val="tx2"/>
+                </a:solidFill>
+              </a:defRPr>
+            </a:lvl2pPr>
+            <a:lvl3pPr eaLnBrk="1" hangingPunct="1">
+              <a:defRPr>
+                <a:solidFill>
+                  <a:schemeClr val="tx2"/>
+                </a:solidFill>
+              </a:defRPr>
+            </a:lvl3pPr>
+            <a:lvl4pPr eaLnBrk="1" hangingPunct="1">
+              <a:defRPr>
+                <a:solidFill>
+                  <a:schemeClr val="tx2"/>
+                </a:solidFill>
+              </a:defRPr>
+            </a:lvl4pPr>
+            <a:lvl5pPr eaLnBrk="1" hangingPunct="1">
+              <a:defRPr>
+                <a:solidFill>
+                  <a:schemeClr val="tx2"/>
+                </a:solidFill>
+              </a:defRPr>
+            </a:lvl5pPr>
+            <a:lvl6pPr eaLnBrk="1" hangingPunct="1">
+              <a:defRPr>
+                <a:solidFill>
+                  <a:schemeClr val="tx2"/>
+                </a:solidFill>
+              </a:defRPr>
+            </a:lvl6pPr>
+            <a:lvl7pPr eaLnBrk="1" hangingPunct="1">
+              <a:defRPr>
+                <a:solidFill>
+                  <a:schemeClr val="tx2"/>
+                </a:solidFill>
+              </a:defRPr>
+            </a:lvl7pPr>
+            <a:lvl8pPr eaLnBrk="1" hangingPunct="1">
+              <a:defRPr>
+                <a:solidFill>
+                  <a:schemeClr val="tx2"/>
+                </a:solidFill>
+              </a:defRPr>
+            </a:lvl8pPr>
+            <a:lvl9pPr eaLnBrk="1" hangingPunct="1">
+              <a:defRPr>
+                <a:solidFill>
+                  <a:schemeClr val="tx2"/>
+                </a:solidFill>
+              </a:defRPr>
+            </a:lvl9pPr>
+          </a:lstStyle>
+          <a:p>
+            <a:pPr algn="ctr"/>
+            <a:r>
+              <a:rPr lang="it-IT" sz="4400" b="1" dirty="0">
+                <a:solidFill>
+                  <a:srgbClr val="FFC000"/>
+                </a:solidFill>
+              </a:rPr>
+              <a:t>RESULT</a:t>
+            </a:r>
+            <a:endParaRPr lang="en-GB" sz="4400" dirty="0"/>
+          </a:p>
+        </p:txBody>
+      </p:sp>
+      <p:graphicFrame>
+        <p:nvGraphicFramePr>
+          <p:cNvPr id="3" name="Grafico 2">
+            <a:extLst>
+              <a:ext uri="{FF2B5EF4-FFF2-40B4-BE49-F238E27FC236}">
+                <a16:creationId xmlns:a16="http://schemas.microsoft.com/office/drawing/2014/main" id="{7BB31060-787E-4613-A9D7-63C6444A844D}"/>
+              </a:ext>
+            </a:extLst>
+          </p:cNvPr>
+          <p:cNvGraphicFramePr>
+            <a:graphicFrameLocks/>
+          </p:cNvGraphicFramePr>
+          <p:nvPr>
+            <p:extLst>
+              <p:ext uri="{D42A27DB-BD31-4B8C-83A1-F6EECF244321}">
+                <p14:modId xmlns:p14="http://schemas.microsoft.com/office/powerpoint/2010/main" val="2007931188"/>
+              </p:ext>
+            </p:extLst>
+          </p:nvPr>
+        </p:nvGraphicFramePr>
+        <p:xfrm>
+          <a:off x="2592925" y="2283948"/>
+          <a:ext cx="7147560" cy="4259580"/>
+        </p:xfrm>
+        <a:graphic>
+          <a:graphicData uri="http://schemas.openxmlformats.org/drawingml/2006/chart">
+            <c:chart xmlns:c="http://schemas.openxmlformats.org/drawingml/2006/chart" xmlns:r="http://schemas.openxmlformats.org/officeDocument/2006/relationships" r:id="rId2"/>
+          </a:graphicData>
+        </a:graphic>
+      </p:graphicFrame>
+      <p:sp>
+        <p:nvSpPr>
+          <p:cNvPr id="4" name="Segnaposto contenuto 2">
+            <a:extLst>
+              <a:ext uri="{FF2B5EF4-FFF2-40B4-BE49-F238E27FC236}">
+                <a16:creationId xmlns:a16="http://schemas.microsoft.com/office/drawing/2014/main" id="{8B824931-297A-4CAF-86D2-180109FEA9A1}"/>
+              </a:ext>
+            </a:extLst>
+          </p:cNvPr>
+          <p:cNvSpPr txBox="1">
+            <a:spLocks/>
+          </p:cNvSpPr>
+          <p:nvPr/>
+        </p:nvSpPr>
+        <p:spPr>
+          <a:xfrm>
+            <a:off x="2484215" y="1412492"/>
+            <a:ext cx="8915400" cy="1207619"/>
+          </a:xfrm>
+          <a:prstGeom prst="rect">
+            <a:avLst/>
+          </a:prstGeom>
+        </p:spPr>
+        <p:txBody>
+          <a:bodyPr/>
+          <a:lstStyle>
+            <a:lvl1pPr marL="342900" indent="-342900" algn="l" defTabSz="457200" rtl="0" eaLnBrk="1" latinLnBrk="0" hangingPunct="1">
+              <a:spcBef>
+                <a:spcPts val="1000"/>
+              </a:spcBef>
+              <a:spcAft>
+                <a:spcPts val="0"/>
+              </a:spcAft>
+              <a:buClr>
+                <a:schemeClr val="accent1"/>
+              </a:buClr>
+              <a:buFont typeface="Wingdings 3" charset="2"/>
+              <a:buChar char=""/>
+              <a:defRPr sz="1800" kern="1200">
+                <a:solidFill>
+                  <a:schemeClr val="tx1">
+                    <a:lumMod val="75000"/>
+                    <a:lumOff val="25000"/>
+                  </a:schemeClr>
+                </a:solidFill>
+                <a:latin typeface="+mn-lt"/>
+                <a:ea typeface="+mn-ea"/>
+                <a:cs typeface="+mn-cs"/>
+              </a:defRPr>
+            </a:lvl1pPr>
+            <a:lvl2pPr marL="742950" indent="-285750" algn="l" defTabSz="457200" rtl="0" eaLnBrk="1" latinLnBrk="0" hangingPunct="1">
+              <a:spcBef>
+                <a:spcPts val="1000"/>
+              </a:spcBef>
+              <a:spcAft>
+                <a:spcPts val="0"/>
+              </a:spcAft>
+              <a:buClr>
+                <a:schemeClr val="accent1"/>
+              </a:buClr>
+              <a:buFont typeface="Wingdings 3" charset="2"/>
+              <a:buChar char=""/>
+              <a:defRPr sz="1600" kern="1200">
+                <a:solidFill>
+                  <a:schemeClr val="tx1">
+                    <a:lumMod val="75000"/>
+                    <a:lumOff val="25000"/>
+                  </a:schemeClr>
+                </a:solidFill>
+                <a:latin typeface="+mn-lt"/>
+                <a:ea typeface="+mn-ea"/>
+                <a:cs typeface="+mn-cs"/>
+              </a:defRPr>
+            </a:lvl2pPr>
+            <a:lvl3pPr marL="1143000" indent="-228600" algn="l" defTabSz="457200" rtl="0" eaLnBrk="1" latinLnBrk="0" hangingPunct="1">
+              <a:spcBef>
+                <a:spcPts val="1000"/>
+              </a:spcBef>
+              <a:spcAft>
+                <a:spcPts val="0"/>
+              </a:spcAft>
+              <a:buClr>
+                <a:schemeClr val="accent1"/>
+              </a:buClr>
+              <a:buFont typeface="Wingdings 3" charset="2"/>
+              <a:buChar char=""/>
+              <a:defRPr sz="1400" kern="1200">
+                <a:solidFill>
+                  <a:schemeClr val="tx1">
+                    <a:lumMod val="75000"/>
+                    <a:lumOff val="25000"/>
+                  </a:schemeClr>
+                </a:solidFill>
+                <a:latin typeface="+mn-lt"/>
+                <a:ea typeface="+mn-ea"/>
+                <a:cs typeface="+mn-cs"/>
+              </a:defRPr>
+            </a:lvl3pPr>
+            <a:lvl4pPr marL="1600200" indent="-228600" algn="l" defTabSz="457200" rtl="0" eaLnBrk="1" latinLnBrk="0" hangingPunct="1">
+              <a:spcBef>
+                <a:spcPts val="1000"/>
+              </a:spcBef>
+              <a:spcAft>
+                <a:spcPts val="0"/>
+              </a:spcAft>
+              <a:buClr>
+                <a:schemeClr val="accent1"/>
+              </a:buClr>
+              <a:buFont typeface="Wingdings 3" charset="2"/>
+              <a:buChar char=""/>
+              <a:defRPr sz="1200" kern="1200">
+                <a:solidFill>
+                  <a:schemeClr val="tx1">
+                    <a:lumMod val="75000"/>
+                    <a:lumOff val="25000"/>
+                  </a:schemeClr>
+                </a:solidFill>
+                <a:latin typeface="+mn-lt"/>
+                <a:ea typeface="+mn-ea"/>
+                <a:cs typeface="+mn-cs"/>
+              </a:defRPr>
+            </a:lvl4pPr>
+            <a:lvl5pPr marL="2057400" indent="-228600" algn="l" defTabSz="457200" rtl="0" eaLnBrk="1" latinLnBrk="0" hangingPunct="1">
+              <a:spcBef>
+                <a:spcPts val="1000"/>
+              </a:spcBef>
+              <a:spcAft>
+                <a:spcPts val="0"/>
+              </a:spcAft>
+              <a:buClr>
+                <a:schemeClr val="accent1"/>
+              </a:buClr>
+              <a:buFont typeface="Wingdings 3" charset="2"/>
+              <a:buChar char=""/>
+              <a:defRPr sz="1200" kern="1200">
+                <a:solidFill>
+                  <a:schemeClr val="tx1">
+                    <a:lumMod val="75000"/>
+                    <a:lumOff val="25000"/>
+                  </a:schemeClr>
+                </a:solidFill>
+                <a:latin typeface="+mn-lt"/>
+                <a:ea typeface="+mn-ea"/>
+                <a:cs typeface="+mn-cs"/>
+              </a:defRPr>
+            </a:lvl5pPr>
+            <a:lvl6pPr marL="2514600" indent="-228600" algn="l" defTabSz="457200" rtl="0" eaLnBrk="1" latinLnBrk="0" hangingPunct="1">
+              <a:spcBef>
+                <a:spcPts val="1000"/>
+              </a:spcBef>
+              <a:spcAft>
+                <a:spcPts val="0"/>
+              </a:spcAft>
+              <a:buClr>
+                <a:schemeClr val="accent1"/>
+              </a:buClr>
+              <a:buFont typeface="Wingdings 3" charset="2"/>
+              <a:buChar char=""/>
+              <a:defRPr sz="1200" kern="1200">
+                <a:solidFill>
+                  <a:schemeClr val="tx1">
+                    <a:lumMod val="75000"/>
+                    <a:lumOff val="25000"/>
+                  </a:schemeClr>
+                </a:solidFill>
+                <a:latin typeface="+mn-lt"/>
+                <a:ea typeface="+mn-ea"/>
+                <a:cs typeface="+mn-cs"/>
+              </a:defRPr>
+            </a:lvl6pPr>
+            <a:lvl7pPr marL="2971800" indent="-228600" algn="l" defTabSz="457200" rtl="0" eaLnBrk="1" latinLnBrk="0" hangingPunct="1">
+              <a:spcBef>
+                <a:spcPts val="1000"/>
+              </a:spcBef>
+              <a:spcAft>
+                <a:spcPts val="0"/>
+              </a:spcAft>
+              <a:buClr>
+                <a:schemeClr val="accent1"/>
+              </a:buClr>
+              <a:buFont typeface="Wingdings 3" charset="2"/>
+              <a:buChar char=""/>
+              <a:defRPr sz="1200" kern="1200">
+                <a:solidFill>
+                  <a:schemeClr val="tx1">
+                    <a:lumMod val="75000"/>
+                    <a:lumOff val="25000"/>
+                  </a:schemeClr>
+                </a:solidFill>
+                <a:latin typeface="+mn-lt"/>
+                <a:ea typeface="+mn-ea"/>
+                <a:cs typeface="+mn-cs"/>
+              </a:defRPr>
+            </a:lvl7pPr>
+            <a:lvl8pPr marL="3429000" indent="-228600" algn="l" defTabSz="457200" rtl="0" eaLnBrk="1" latinLnBrk="0" hangingPunct="1">
+              <a:spcBef>
+                <a:spcPts val="1000"/>
+              </a:spcBef>
+              <a:spcAft>
+                <a:spcPts val="0"/>
+              </a:spcAft>
+              <a:buClr>
+                <a:schemeClr val="accent1"/>
+              </a:buClr>
+              <a:buFont typeface="Wingdings 3" charset="2"/>
+              <a:buChar char=""/>
+              <a:defRPr sz="1200" kern="1200">
+                <a:solidFill>
+                  <a:schemeClr val="tx1">
+                    <a:lumMod val="75000"/>
+                    <a:lumOff val="25000"/>
+                  </a:schemeClr>
+                </a:solidFill>
+                <a:latin typeface="+mn-lt"/>
+                <a:ea typeface="+mn-ea"/>
+                <a:cs typeface="+mn-cs"/>
+              </a:defRPr>
+            </a:lvl8pPr>
+            <a:lvl9pPr marL="3886200" indent="-228600" algn="l" defTabSz="457200" rtl="0" eaLnBrk="1" latinLnBrk="0" hangingPunct="1">
+              <a:spcBef>
+                <a:spcPts val="1000"/>
+              </a:spcBef>
+              <a:spcAft>
+                <a:spcPts val="0"/>
+              </a:spcAft>
+              <a:buClr>
+                <a:schemeClr val="accent1"/>
+              </a:buClr>
+              <a:buFont typeface="Wingdings 3" charset="2"/>
+              <a:buChar char=""/>
+              <a:defRPr sz="1200" kern="1200">
+                <a:solidFill>
+                  <a:schemeClr val="tx1">
+                    <a:lumMod val="75000"/>
+                    <a:lumOff val="25000"/>
+                  </a:schemeClr>
+                </a:solidFill>
+                <a:latin typeface="+mn-lt"/>
+                <a:ea typeface="+mn-ea"/>
+                <a:cs typeface="+mn-cs"/>
+              </a:defRPr>
+            </a:lvl9pPr>
+          </a:lstStyle>
+          <a:p>
+            <a:r>
+              <a:rPr lang="en-GB" sz="1600" dirty="0"/>
+              <a:t>Execution time compered to dataset length</a:t>
+            </a:r>
+          </a:p>
+          <a:p>
+            <a:pPr marL="0" indent="0">
+              <a:buNone/>
+            </a:pPr>
+            <a:r>
+              <a:rPr lang="en-GB" sz="1600" dirty="0"/>
+              <a:t>	</a:t>
+            </a:r>
+            <a:r>
+              <a:rPr lang="en-GB" sz="1200" dirty="0"/>
+              <a:t>Dataset: random created, k = 4, L = 8, CPU = 24</a:t>
+            </a:r>
+          </a:p>
+        </p:txBody>
+      </p:sp>
+    </p:spTree>
+    <p:extLst>
+      <p:ext uri="{BB962C8B-B14F-4D97-AF65-F5344CB8AC3E}">
+        <p14:creationId xmlns:p14="http://schemas.microsoft.com/office/powerpoint/2010/main" val="3826835571"/>
+      </p:ext>
+    </p:extLst>
+  </p:cSld>
+  <p:clrMapOvr>
+    <a:masterClrMapping/>
+  </p:clrMapOvr>
+</p:sld>
+</file>
+
+<file path=ppt/slides/slide26.xml><?xml version="1.0" encoding="utf-8"?>
+<p:sld xmlns:a="http://schemas.openxmlformats.org/drawingml/2006/main" xmlns:r="http://schemas.openxmlformats.org/officeDocument/2006/relationships" xmlns:p="http://schemas.openxmlformats.org/presentationml/2006/main">
+  <p:cSld>
+    <p:spTree>
+      <p:nvGrpSpPr>
+        <p:cNvPr id="1" name=""/>
+        <p:cNvGrpSpPr/>
+        <p:nvPr/>
+      </p:nvGrpSpPr>
+      <p:grpSpPr>
+        <a:xfrm>
+          <a:off x="0" y="0"/>
+          <a:ext cx="0" cy="0"/>
+          <a:chOff x="0" y="0"/>
+          <a:chExt cx="0" cy="0"/>
+        </a:xfrm>
+      </p:grpSpPr>
+      <p:sp>
+        <p:nvSpPr>
+          <p:cNvPr id="5" name="Titolo 1">
+            <a:extLst>
+              <a:ext uri="{FF2B5EF4-FFF2-40B4-BE49-F238E27FC236}">
+                <a16:creationId xmlns:a16="http://schemas.microsoft.com/office/drawing/2014/main" id="{0C734ED3-9278-4126-AE51-FE48147C659D}"/>
+              </a:ext>
+            </a:extLst>
+          </p:cNvPr>
+          <p:cNvSpPr txBox="1">
+            <a:spLocks/>
+          </p:cNvSpPr>
+          <p:nvPr/>
+        </p:nvSpPr>
+        <p:spPr>
+          <a:xfrm>
+            <a:off x="1710861" y="632902"/>
+            <a:ext cx="8911687" cy="1280890"/>
+          </a:xfrm>
+          <a:prstGeom prst="rect">
+            <a:avLst/>
+          </a:prstGeom>
+        </p:spPr>
+        <p:txBody>
+          <a:bodyPr vert="horz" lIns="91440" tIns="45720" rIns="91440" bIns="45720" rtlCol="0" anchor="t">
+            <a:normAutofit/>
+          </a:bodyPr>
+          <a:lstStyle>
+            <a:lvl1pPr algn="l" defTabSz="457200" rtl="0" eaLnBrk="1" latinLnBrk="0" hangingPunct="1">
+              <a:spcBef>
+                <a:spcPct val="0"/>
+              </a:spcBef>
+              <a:buNone/>
+              <a:defRPr sz="3600" kern="1200">
+                <a:solidFill>
+                  <a:schemeClr val="tx1">
+                    <a:lumMod val="85000"/>
+                    <a:lumOff val="15000"/>
+                  </a:schemeClr>
+                </a:solidFill>
+                <a:latin typeface="+mj-lt"/>
+                <a:ea typeface="+mj-ea"/>
+                <a:cs typeface="+mj-cs"/>
+              </a:defRPr>
+            </a:lvl1pPr>
+            <a:lvl2pPr eaLnBrk="1" hangingPunct="1">
+              <a:defRPr>
+                <a:solidFill>
+                  <a:schemeClr val="tx2"/>
+                </a:solidFill>
+              </a:defRPr>
+            </a:lvl2pPr>
+            <a:lvl3pPr eaLnBrk="1" hangingPunct="1">
+              <a:defRPr>
+                <a:solidFill>
+                  <a:schemeClr val="tx2"/>
+                </a:solidFill>
+              </a:defRPr>
+            </a:lvl3pPr>
+            <a:lvl4pPr eaLnBrk="1" hangingPunct="1">
+              <a:defRPr>
+                <a:solidFill>
+                  <a:schemeClr val="tx2"/>
+                </a:solidFill>
+              </a:defRPr>
+            </a:lvl4pPr>
+            <a:lvl5pPr eaLnBrk="1" hangingPunct="1">
+              <a:defRPr>
+                <a:solidFill>
+                  <a:schemeClr val="tx2"/>
+                </a:solidFill>
+              </a:defRPr>
+            </a:lvl5pPr>
+            <a:lvl6pPr eaLnBrk="1" hangingPunct="1">
+              <a:defRPr>
+                <a:solidFill>
+                  <a:schemeClr val="tx2"/>
+                </a:solidFill>
+              </a:defRPr>
+            </a:lvl6pPr>
+            <a:lvl7pPr eaLnBrk="1" hangingPunct="1">
+              <a:defRPr>
+                <a:solidFill>
+                  <a:schemeClr val="tx2"/>
+                </a:solidFill>
+              </a:defRPr>
+            </a:lvl7pPr>
+            <a:lvl8pPr eaLnBrk="1" hangingPunct="1">
+              <a:defRPr>
+                <a:solidFill>
+                  <a:schemeClr val="tx2"/>
+                </a:solidFill>
+              </a:defRPr>
+            </a:lvl8pPr>
+            <a:lvl9pPr eaLnBrk="1" hangingPunct="1">
+              <a:defRPr>
+                <a:solidFill>
+                  <a:schemeClr val="tx2"/>
+                </a:solidFill>
+              </a:defRPr>
+            </a:lvl9pPr>
+          </a:lstStyle>
+          <a:p>
+            <a:pPr algn="ctr"/>
+            <a:r>
+              <a:rPr lang="it-IT" sz="4400" b="1" dirty="0">
+                <a:solidFill>
+                  <a:srgbClr val="FFC000"/>
+                </a:solidFill>
+              </a:rPr>
+              <a:t>RESULT</a:t>
+            </a:r>
+            <a:endParaRPr lang="en-GB" sz="4400" dirty="0"/>
+          </a:p>
+        </p:txBody>
+      </p:sp>
+      <p:sp>
+        <p:nvSpPr>
+          <p:cNvPr id="3" name="Segnaposto contenuto 2">
+            <a:extLst>
+              <a:ext uri="{FF2B5EF4-FFF2-40B4-BE49-F238E27FC236}">
+                <a16:creationId xmlns:a16="http://schemas.microsoft.com/office/drawing/2014/main" id="{4CD6C871-05E5-49BC-9652-5D8E1AA7EBA4}"/>
+              </a:ext>
+            </a:extLst>
+          </p:cNvPr>
+          <p:cNvSpPr txBox="1">
+            <a:spLocks/>
+          </p:cNvSpPr>
+          <p:nvPr/>
+        </p:nvSpPr>
+        <p:spPr>
+          <a:xfrm>
+            <a:off x="2484215" y="1412492"/>
+            <a:ext cx="8915400" cy="1207619"/>
+          </a:xfrm>
+          <a:prstGeom prst="rect">
+            <a:avLst/>
+          </a:prstGeom>
+        </p:spPr>
+        <p:txBody>
+          <a:bodyPr/>
+          <a:lstStyle>
+            <a:lvl1pPr marL="342900" indent="-342900" algn="l" defTabSz="457200" rtl="0" eaLnBrk="1" latinLnBrk="0" hangingPunct="1">
+              <a:spcBef>
+                <a:spcPts val="1000"/>
+              </a:spcBef>
+              <a:spcAft>
+                <a:spcPts val="0"/>
+              </a:spcAft>
+              <a:buClr>
+                <a:schemeClr val="accent1"/>
+              </a:buClr>
+              <a:buFont typeface="Wingdings 3" charset="2"/>
+              <a:buChar char=""/>
+              <a:defRPr sz="1800" kern="1200">
+                <a:solidFill>
+                  <a:schemeClr val="tx1">
+                    <a:lumMod val="75000"/>
+                    <a:lumOff val="25000"/>
+                  </a:schemeClr>
+                </a:solidFill>
+                <a:latin typeface="+mn-lt"/>
+                <a:ea typeface="+mn-ea"/>
+                <a:cs typeface="+mn-cs"/>
+              </a:defRPr>
+            </a:lvl1pPr>
+            <a:lvl2pPr marL="742950" indent="-285750" algn="l" defTabSz="457200" rtl="0" eaLnBrk="1" latinLnBrk="0" hangingPunct="1">
+              <a:spcBef>
+                <a:spcPts val="1000"/>
+              </a:spcBef>
+              <a:spcAft>
+                <a:spcPts val="0"/>
+              </a:spcAft>
+              <a:buClr>
+                <a:schemeClr val="accent1"/>
+              </a:buClr>
+              <a:buFont typeface="Wingdings 3" charset="2"/>
+              <a:buChar char=""/>
+              <a:defRPr sz="1600" kern="1200">
+                <a:solidFill>
+                  <a:schemeClr val="tx1">
+                    <a:lumMod val="75000"/>
+                    <a:lumOff val="25000"/>
+                  </a:schemeClr>
+                </a:solidFill>
+                <a:latin typeface="+mn-lt"/>
+                <a:ea typeface="+mn-ea"/>
+                <a:cs typeface="+mn-cs"/>
+              </a:defRPr>
+            </a:lvl2pPr>
+            <a:lvl3pPr marL="1143000" indent="-228600" algn="l" defTabSz="457200" rtl="0" eaLnBrk="1" latinLnBrk="0" hangingPunct="1">
+              <a:spcBef>
+                <a:spcPts val="1000"/>
+              </a:spcBef>
+              <a:spcAft>
+                <a:spcPts val="0"/>
+              </a:spcAft>
+              <a:buClr>
+                <a:schemeClr val="accent1"/>
+              </a:buClr>
+              <a:buFont typeface="Wingdings 3" charset="2"/>
+              <a:buChar char=""/>
+              <a:defRPr sz="1400" kern="1200">
+                <a:solidFill>
+                  <a:schemeClr val="tx1">
+                    <a:lumMod val="75000"/>
+                    <a:lumOff val="25000"/>
+                  </a:schemeClr>
+                </a:solidFill>
+                <a:latin typeface="+mn-lt"/>
+                <a:ea typeface="+mn-ea"/>
+                <a:cs typeface="+mn-cs"/>
+              </a:defRPr>
+            </a:lvl3pPr>
+            <a:lvl4pPr marL="1600200" indent="-228600" algn="l" defTabSz="457200" rtl="0" eaLnBrk="1" latinLnBrk="0" hangingPunct="1">
+              <a:spcBef>
+                <a:spcPts val="1000"/>
+              </a:spcBef>
+              <a:spcAft>
+                <a:spcPts val="0"/>
+              </a:spcAft>
+              <a:buClr>
+                <a:schemeClr val="accent1"/>
+              </a:buClr>
+              <a:buFont typeface="Wingdings 3" charset="2"/>
+              <a:buChar char=""/>
+              <a:defRPr sz="1200" kern="1200">
+                <a:solidFill>
+                  <a:schemeClr val="tx1">
+                    <a:lumMod val="75000"/>
+                    <a:lumOff val="25000"/>
+                  </a:schemeClr>
+                </a:solidFill>
+                <a:latin typeface="+mn-lt"/>
+                <a:ea typeface="+mn-ea"/>
+                <a:cs typeface="+mn-cs"/>
+              </a:defRPr>
+            </a:lvl4pPr>
+            <a:lvl5pPr marL="2057400" indent="-228600" algn="l" defTabSz="457200" rtl="0" eaLnBrk="1" latinLnBrk="0" hangingPunct="1">
+              <a:spcBef>
+                <a:spcPts val="1000"/>
+              </a:spcBef>
+              <a:spcAft>
+                <a:spcPts val="0"/>
+              </a:spcAft>
+              <a:buClr>
+                <a:schemeClr val="accent1"/>
+              </a:buClr>
+              <a:buFont typeface="Wingdings 3" charset="2"/>
+              <a:buChar char=""/>
+              <a:defRPr sz="1200" kern="1200">
+                <a:solidFill>
+                  <a:schemeClr val="tx1">
+                    <a:lumMod val="75000"/>
+                    <a:lumOff val="25000"/>
+                  </a:schemeClr>
+                </a:solidFill>
+                <a:latin typeface="+mn-lt"/>
+                <a:ea typeface="+mn-ea"/>
+                <a:cs typeface="+mn-cs"/>
+              </a:defRPr>
+            </a:lvl5pPr>
+            <a:lvl6pPr marL="2514600" indent="-228600" algn="l" defTabSz="457200" rtl="0" eaLnBrk="1" latinLnBrk="0" hangingPunct="1">
+              <a:spcBef>
+                <a:spcPts val="1000"/>
+              </a:spcBef>
+              <a:spcAft>
+                <a:spcPts val="0"/>
+              </a:spcAft>
+              <a:buClr>
+                <a:schemeClr val="accent1"/>
+              </a:buClr>
+              <a:buFont typeface="Wingdings 3" charset="2"/>
+              <a:buChar char=""/>
+              <a:defRPr sz="1200" kern="1200">
+                <a:solidFill>
+                  <a:schemeClr val="tx1">
+                    <a:lumMod val="75000"/>
+                    <a:lumOff val="25000"/>
+                  </a:schemeClr>
+                </a:solidFill>
+                <a:latin typeface="+mn-lt"/>
+                <a:ea typeface="+mn-ea"/>
+                <a:cs typeface="+mn-cs"/>
+              </a:defRPr>
+            </a:lvl6pPr>
+            <a:lvl7pPr marL="2971800" indent="-228600" algn="l" defTabSz="457200" rtl="0" eaLnBrk="1" latinLnBrk="0" hangingPunct="1">
+              <a:spcBef>
+                <a:spcPts val="1000"/>
+              </a:spcBef>
+              <a:spcAft>
+                <a:spcPts val="0"/>
+              </a:spcAft>
+              <a:buClr>
+                <a:schemeClr val="accent1"/>
+              </a:buClr>
+              <a:buFont typeface="Wingdings 3" charset="2"/>
+              <a:buChar char=""/>
+              <a:defRPr sz="1200" kern="1200">
+                <a:solidFill>
+                  <a:schemeClr val="tx1">
+                    <a:lumMod val="75000"/>
+                    <a:lumOff val="25000"/>
+                  </a:schemeClr>
+                </a:solidFill>
+                <a:latin typeface="+mn-lt"/>
+                <a:ea typeface="+mn-ea"/>
+                <a:cs typeface="+mn-cs"/>
+              </a:defRPr>
+            </a:lvl7pPr>
+            <a:lvl8pPr marL="3429000" indent="-228600" algn="l" defTabSz="457200" rtl="0" eaLnBrk="1" latinLnBrk="0" hangingPunct="1">
+              <a:spcBef>
+                <a:spcPts val="1000"/>
+              </a:spcBef>
+              <a:spcAft>
+                <a:spcPts val="0"/>
+              </a:spcAft>
+              <a:buClr>
+                <a:schemeClr val="accent1"/>
+              </a:buClr>
+              <a:buFont typeface="Wingdings 3" charset="2"/>
+              <a:buChar char=""/>
+              <a:defRPr sz="1200" kern="1200">
+                <a:solidFill>
+                  <a:schemeClr val="tx1">
+                    <a:lumMod val="75000"/>
+                    <a:lumOff val="25000"/>
+                  </a:schemeClr>
+                </a:solidFill>
+                <a:latin typeface="+mn-lt"/>
+                <a:ea typeface="+mn-ea"/>
+                <a:cs typeface="+mn-cs"/>
+              </a:defRPr>
+            </a:lvl8pPr>
+            <a:lvl9pPr marL="3886200" indent="-228600" algn="l" defTabSz="457200" rtl="0" eaLnBrk="1" latinLnBrk="0" hangingPunct="1">
+              <a:spcBef>
+                <a:spcPts val="1000"/>
+              </a:spcBef>
+              <a:spcAft>
+                <a:spcPts val="0"/>
+              </a:spcAft>
+              <a:buClr>
+                <a:schemeClr val="accent1"/>
+              </a:buClr>
+              <a:buFont typeface="Wingdings 3" charset="2"/>
+              <a:buChar char=""/>
+              <a:defRPr sz="1200" kern="1200">
+                <a:solidFill>
+                  <a:schemeClr val="tx1">
+                    <a:lumMod val="75000"/>
+                    <a:lumOff val="25000"/>
+                  </a:schemeClr>
+                </a:solidFill>
+                <a:latin typeface="+mn-lt"/>
+                <a:ea typeface="+mn-ea"/>
+                <a:cs typeface="+mn-cs"/>
+              </a:defRPr>
+            </a:lvl9pPr>
+          </a:lstStyle>
+          <a:p>
+            <a:r>
+              <a:rPr lang="en-GB" sz="1600" dirty="0"/>
+              <a:t>Execution time compered to K</a:t>
+            </a:r>
+          </a:p>
+          <a:p>
+            <a:pPr marL="0" indent="0">
+              <a:buNone/>
+            </a:pPr>
+            <a:r>
+              <a:rPr lang="en-GB" sz="1600" dirty="0"/>
+              <a:t>	</a:t>
+            </a:r>
+            <a:r>
+              <a:rPr lang="en-GB" sz="1200" dirty="0"/>
+              <a:t>Dataset: gbgss116, L = 2*k, CPU = 24</a:t>
+            </a:r>
+          </a:p>
+        </p:txBody>
+      </p:sp>
+      <p:graphicFrame>
+        <p:nvGraphicFramePr>
+          <p:cNvPr id="4" name="Grafico 3">
+            <a:extLst>
+              <a:ext uri="{FF2B5EF4-FFF2-40B4-BE49-F238E27FC236}">
+                <a16:creationId xmlns:a16="http://schemas.microsoft.com/office/drawing/2014/main" id="{62F3356D-386B-4738-B314-0449C87293D7}"/>
+              </a:ext>
+            </a:extLst>
+          </p:cNvPr>
+          <p:cNvGraphicFramePr>
+            <a:graphicFrameLocks/>
+          </p:cNvGraphicFramePr>
+          <p:nvPr>
+            <p:extLst>
+              <p:ext uri="{D42A27DB-BD31-4B8C-83A1-F6EECF244321}">
+                <p14:modId xmlns:p14="http://schemas.microsoft.com/office/powerpoint/2010/main" val="2568275871"/>
+              </p:ext>
+            </p:extLst>
+          </p:nvPr>
+        </p:nvGraphicFramePr>
+        <p:xfrm>
+          <a:off x="2592924" y="2292741"/>
+          <a:ext cx="7147560" cy="4259580"/>
+        </p:xfrm>
+        <a:graphic>
+          <a:graphicData uri="http://schemas.openxmlformats.org/drawingml/2006/chart">
+            <c:chart xmlns:c="http://schemas.openxmlformats.org/drawingml/2006/chart" xmlns:r="http://schemas.openxmlformats.org/officeDocument/2006/relationships" r:id="rId2"/>
+          </a:graphicData>
+        </a:graphic>
+      </p:graphicFrame>
+    </p:spTree>
+    <p:extLst>
+      <p:ext uri="{BB962C8B-B14F-4D97-AF65-F5344CB8AC3E}">
+        <p14:creationId xmlns:p14="http://schemas.microsoft.com/office/powerpoint/2010/main" val="3900854375"/>
+      </p:ext>
+    </p:extLst>
+  </p:cSld>
+  <p:clrMapOvr>
+    <a:masterClrMapping/>
+  </p:clrMapOvr>
+</p:sld>
+</file>
+
+<file path=ppt/slides/slide27.xml><?xml version="1.0" encoding="utf-8"?>
+<p:sld xmlns:a="http://schemas.openxmlformats.org/drawingml/2006/main" xmlns:r="http://schemas.openxmlformats.org/officeDocument/2006/relationships" xmlns:p="http://schemas.openxmlformats.org/presentationml/2006/main">
+  <p:cSld>
+    <p:spTree>
+      <p:nvGrpSpPr>
+        <p:cNvPr id="1" name=""/>
+        <p:cNvGrpSpPr/>
+        <p:nvPr/>
+      </p:nvGrpSpPr>
+      <p:grpSpPr>
+        <a:xfrm>
+          <a:off x="0" y="0"/>
+          <a:ext cx="0" cy="0"/>
+          <a:chOff x="0" y="0"/>
+          <a:chExt cx="0" cy="0"/>
+        </a:xfrm>
+      </p:grpSpPr>
+      <p:sp>
+        <p:nvSpPr>
+          <p:cNvPr id="5" name="Titolo 1">
+            <a:extLst>
+              <a:ext uri="{FF2B5EF4-FFF2-40B4-BE49-F238E27FC236}">
+                <a16:creationId xmlns:a16="http://schemas.microsoft.com/office/drawing/2014/main" id="{0C734ED3-9278-4126-AE51-FE48147C659D}"/>
+              </a:ext>
+            </a:extLst>
+          </p:cNvPr>
+          <p:cNvSpPr txBox="1">
+            <a:spLocks/>
+          </p:cNvSpPr>
+          <p:nvPr/>
+        </p:nvSpPr>
+        <p:spPr>
+          <a:xfrm>
+            <a:off x="1710861" y="632902"/>
+            <a:ext cx="8911687" cy="1280890"/>
+          </a:xfrm>
+          <a:prstGeom prst="rect">
+            <a:avLst/>
+          </a:prstGeom>
+        </p:spPr>
+        <p:txBody>
+          <a:bodyPr vert="horz" lIns="91440" tIns="45720" rIns="91440" bIns="45720" rtlCol="0" anchor="t">
+            <a:normAutofit/>
+          </a:bodyPr>
+          <a:lstStyle>
+            <a:lvl1pPr algn="l" defTabSz="457200" rtl="0" eaLnBrk="1" latinLnBrk="0" hangingPunct="1">
+              <a:spcBef>
+                <a:spcPct val="0"/>
+              </a:spcBef>
+              <a:buNone/>
+              <a:defRPr sz="3600" kern="1200">
+                <a:solidFill>
+                  <a:schemeClr val="tx1">
+                    <a:lumMod val="85000"/>
+                    <a:lumOff val="15000"/>
+                  </a:schemeClr>
+                </a:solidFill>
+                <a:latin typeface="+mj-lt"/>
+                <a:ea typeface="+mj-ea"/>
+                <a:cs typeface="+mj-cs"/>
+              </a:defRPr>
+            </a:lvl1pPr>
+            <a:lvl2pPr eaLnBrk="1" hangingPunct="1">
+              <a:defRPr>
+                <a:solidFill>
+                  <a:schemeClr val="tx2"/>
+                </a:solidFill>
+              </a:defRPr>
+            </a:lvl2pPr>
+            <a:lvl3pPr eaLnBrk="1" hangingPunct="1">
+              <a:defRPr>
+                <a:solidFill>
+                  <a:schemeClr val="tx2"/>
+                </a:solidFill>
+              </a:defRPr>
+            </a:lvl3pPr>
+            <a:lvl4pPr eaLnBrk="1" hangingPunct="1">
+              <a:defRPr>
+                <a:solidFill>
+                  <a:schemeClr val="tx2"/>
+                </a:solidFill>
+              </a:defRPr>
+            </a:lvl4pPr>
+            <a:lvl5pPr eaLnBrk="1" hangingPunct="1">
+              <a:defRPr>
+                <a:solidFill>
+                  <a:schemeClr val="tx2"/>
+                </a:solidFill>
+              </a:defRPr>
+            </a:lvl5pPr>
+            <a:lvl6pPr eaLnBrk="1" hangingPunct="1">
+              <a:defRPr>
+                <a:solidFill>
+                  <a:schemeClr val="tx2"/>
+                </a:solidFill>
+              </a:defRPr>
+            </a:lvl6pPr>
+            <a:lvl7pPr eaLnBrk="1" hangingPunct="1">
+              <a:defRPr>
+                <a:solidFill>
+                  <a:schemeClr val="tx2"/>
+                </a:solidFill>
+              </a:defRPr>
+            </a:lvl7pPr>
+            <a:lvl8pPr eaLnBrk="1" hangingPunct="1">
+              <a:defRPr>
+                <a:solidFill>
+                  <a:schemeClr val="tx2"/>
+                </a:solidFill>
+              </a:defRPr>
+            </a:lvl8pPr>
+            <a:lvl9pPr eaLnBrk="1" hangingPunct="1">
+              <a:defRPr>
+                <a:solidFill>
+                  <a:schemeClr val="tx2"/>
+                </a:solidFill>
+              </a:defRPr>
+            </a:lvl9pPr>
+          </a:lstStyle>
+          <a:p>
+            <a:pPr algn="ctr"/>
+            <a:r>
+              <a:rPr lang="it-IT" sz="4400" b="1" dirty="0">
+                <a:solidFill>
+                  <a:srgbClr val="FFC000"/>
+                </a:solidFill>
+              </a:rPr>
+              <a:t>RESULT</a:t>
+            </a:r>
+            <a:endParaRPr lang="en-GB" sz="4400" dirty="0"/>
+          </a:p>
+        </p:txBody>
+      </p:sp>
+    </p:spTree>
+    <p:extLst>
+      <p:ext uri="{BB962C8B-B14F-4D97-AF65-F5344CB8AC3E}">
+        <p14:creationId xmlns:p14="http://schemas.microsoft.com/office/powerpoint/2010/main" val="881267136"/>
+      </p:ext>
+    </p:extLst>
+  </p:cSld>
+  <p:clrMapOvr>
+    <a:masterClrMapping/>
+  </p:clrMapOvr>
+</p:sld>
+</file>
+
+<file path=ppt/slides/slide28.xml><?xml version="1.0" encoding="utf-8"?>
+<p:sld xmlns:a="http://schemas.openxmlformats.org/drawingml/2006/main" xmlns:r="http://schemas.openxmlformats.org/officeDocument/2006/relationships" xmlns:p="http://schemas.openxmlformats.org/presentationml/2006/main">
+  <p:cSld>
+    <p:spTree>
+      <p:nvGrpSpPr>
+        <p:cNvPr id="1" name=""/>
+        <p:cNvGrpSpPr/>
+        <p:nvPr/>
+      </p:nvGrpSpPr>
+      <p:grpSpPr>
+        <a:xfrm>
+          <a:off x="0" y="0"/>
+          <a:ext cx="0" cy="0"/>
+          <a:chOff x="0" y="0"/>
+          <a:chExt cx="0" cy="0"/>
+        </a:xfrm>
+      </p:grpSpPr>
+      <p:sp>
+        <p:nvSpPr>
+          <p:cNvPr id="5" name="Titolo 1">
+            <a:extLst>
+              <a:ext uri="{FF2B5EF4-FFF2-40B4-BE49-F238E27FC236}">
+                <a16:creationId xmlns:a16="http://schemas.microsoft.com/office/drawing/2014/main" id="{0C734ED3-9278-4126-AE51-FE48147C659D}"/>
+              </a:ext>
+            </a:extLst>
+          </p:cNvPr>
+          <p:cNvSpPr txBox="1">
+            <a:spLocks/>
+          </p:cNvSpPr>
+          <p:nvPr/>
+        </p:nvSpPr>
+        <p:spPr>
+          <a:xfrm>
+            <a:off x="2592925" y="624110"/>
+            <a:ext cx="8911687" cy="1280890"/>
+          </a:xfrm>
+          <a:prstGeom prst="rect">
+            <a:avLst/>
+          </a:prstGeom>
+        </p:spPr>
+        <p:txBody>
+          <a:bodyPr vert="horz" lIns="91440" tIns="45720" rIns="91440" bIns="45720" rtlCol="0" anchor="t">
+            <a:normAutofit/>
+          </a:bodyPr>
+          <a:lstStyle>
+            <a:lvl1pPr algn="l" defTabSz="457200" rtl="0" eaLnBrk="1" latinLnBrk="0" hangingPunct="1">
+              <a:spcBef>
+                <a:spcPct val="0"/>
+              </a:spcBef>
+              <a:buNone/>
+              <a:defRPr sz="3600" kern="1200">
+                <a:solidFill>
+                  <a:schemeClr val="tx1">
+                    <a:lumMod val="85000"/>
+                    <a:lumOff val="15000"/>
+                  </a:schemeClr>
+                </a:solidFill>
+                <a:latin typeface="+mj-lt"/>
+                <a:ea typeface="+mj-ea"/>
+                <a:cs typeface="+mj-cs"/>
+              </a:defRPr>
+            </a:lvl1pPr>
+            <a:lvl2pPr eaLnBrk="1" hangingPunct="1">
+              <a:defRPr>
+                <a:solidFill>
+                  <a:schemeClr val="tx2"/>
+                </a:solidFill>
+              </a:defRPr>
+            </a:lvl2pPr>
+            <a:lvl3pPr eaLnBrk="1" hangingPunct="1">
+              <a:defRPr>
+                <a:solidFill>
+                  <a:schemeClr val="tx2"/>
+                </a:solidFill>
+              </a:defRPr>
+            </a:lvl3pPr>
+            <a:lvl4pPr eaLnBrk="1" hangingPunct="1">
+              <a:defRPr>
+                <a:solidFill>
+                  <a:schemeClr val="tx2"/>
+                </a:solidFill>
+              </a:defRPr>
+            </a:lvl4pPr>
+            <a:lvl5pPr eaLnBrk="1" hangingPunct="1">
+              <a:defRPr>
+                <a:solidFill>
+                  <a:schemeClr val="tx2"/>
+                </a:solidFill>
+              </a:defRPr>
+            </a:lvl5pPr>
+            <a:lvl6pPr eaLnBrk="1" hangingPunct="1">
+              <a:defRPr>
+                <a:solidFill>
+                  <a:schemeClr val="tx2"/>
+                </a:solidFill>
+              </a:defRPr>
+            </a:lvl6pPr>
+            <a:lvl7pPr eaLnBrk="1" hangingPunct="1">
+              <a:defRPr>
+                <a:solidFill>
+                  <a:schemeClr val="tx2"/>
+                </a:solidFill>
+              </a:defRPr>
+            </a:lvl7pPr>
+            <a:lvl8pPr eaLnBrk="1" hangingPunct="1">
+              <a:defRPr>
+                <a:solidFill>
+                  <a:schemeClr val="tx2"/>
+                </a:solidFill>
+              </a:defRPr>
+            </a:lvl8pPr>
+            <a:lvl9pPr eaLnBrk="1" hangingPunct="1">
+              <a:defRPr>
+                <a:solidFill>
+                  <a:schemeClr val="tx2"/>
+                </a:solidFill>
+              </a:defRPr>
+            </a:lvl9pPr>
+          </a:lstStyle>
+          <a:p>
+            <a:pPr algn="ctr"/>
+            <a:r>
+              <a:rPr lang="it-IT" sz="4400" b="1" dirty="0">
+                <a:solidFill>
+                  <a:srgbClr val="FFC000"/>
+                </a:solidFill>
+              </a:rPr>
+              <a:t>CONSIDERATIONS</a:t>
+            </a:r>
+            <a:endParaRPr lang="en-GB" sz="4400" dirty="0"/>
+          </a:p>
+        </p:txBody>
+      </p:sp>
+    </p:spTree>
+    <p:extLst>
+      <p:ext uri="{BB962C8B-B14F-4D97-AF65-F5344CB8AC3E}">
+        <p14:creationId xmlns:p14="http://schemas.microsoft.com/office/powerpoint/2010/main" val="1606113577"/>
+      </p:ext>
+    </p:extLst>
+  </p:cSld>
+  <p:clrMapOvr>
+    <a:masterClrMapping/>
+  </p:clrMapOvr>
+</p:sld>
+</file>
+
+<file path=ppt/slides/slide29.xml><?xml version="1.0" encoding="utf-8"?>
+<p:sld xmlns:a="http://schemas.openxmlformats.org/drawingml/2006/main" xmlns:r="http://schemas.openxmlformats.org/officeDocument/2006/relationships" xmlns:p="http://schemas.openxmlformats.org/presentationml/2006/main">
+  <p:cSld>
+    <p:spTree>
+      <p:nvGrpSpPr>
+        <p:cNvPr id="1" name=""/>
+        <p:cNvGrpSpPr/>
+        <p:nvPr/>
+      </p:nvGrpSpPr>
+      <p:grpSpPr>
+        <a:xfrm>
+          <a:off x="0" y="0"/>
+          <a:ext cx="0" cy="0"/>
+          <a:chOff x="0" y="0"/>
+          <a:chExt cx="0" cy="0"/>
+        </a:xfrm>
+      </p:grpSpPr>
+      <p:sp>
+        <p:nvSpPr>
+          <p:cNvPr id="3" name="Titolo 1">
+            <a:extLst>
+              <a:ext uri="{FF2B5EF4-FFF2-40B4-BE49-F238E27FC236}">
+                <a16:creationId xmlns:a16="http://schemas.microsoft.com/office/drawing/2014/main" id="{94E84D07-737A-465E-A979-5A405BD14147}"/>
+              </a:ext>
+            </a:extLst>
+          </p:cNvPr>
+          <p:cNvSpPr txBox="1">
+            <a:spLocks/>
+          </p:cNvSpPr>
+          <p:nvPr/>
+        </p:nvSpPr>
+        <p:spPr>
+          <a:xfrm>
+            <a:off x="2592925" y="624110"/>
+            <a:ext cx="8911687" cy="1280890"/>
+          </a:xfrm>
+          <a:prstGeom prst="rect">
+            <a:avLst/>
+          </a:prstGeom>
+        </p:spPr>
+        <p:txBody>
+          <a:bodyPr vert="horz" lIns="91440" tIns="45720" rIns="91440" bIns="45720" rtlCol="0" anchor="t">
+            <a:normAutofit/>
+          </a:bodyPr>
+          <a:lstStyle>
+            <a:lvl1pPr algn="l" defTabSz="457200" rtl="0" eaLnBrk="1" latinLnBrk="0" hangingPunct="1">
+              <a:spcBef>
+                <a:spcPct val="0"/>
+              </a:spcBef>
+              <a:buNone/>
+              <a:defRPr sz="3600" kern="1200">
+                <a:solidFill>
+                  <a:schemeClr val="tx1">
+                    <a:lumMod val="85000"/>
+                    <a:lumOff val="15000"/>
+                  </a:schemeClr>
+                </a:solidFill>
+                <a:latin typeface="+mj-lt"/>
+                <a:ea typeface="+mj-ea"/>
+                <a:cs typeface="+mj-cs"/>
+              </a:defRPr>
+            </a:lvl1pPr>
+            <a:lvl2pPr eaLnBrk="1" hangingPunct="1">
+              <a:defRPr>
+                <a:solidFill>
+                  <a:schemeClr val="tx2"/>
+                </a:solidFill>
+              </a:defRPr>
+            </a:lvl2pPr>
+            <a:lvl3pPr eaLnBrk="1" hangingPunct="1">
+              <a:defRPr>
+                <a:solidFill>
+                  <a:schemeClr val="tx2"/>
+                </a:solidFill>
+              </a:defRPr>
+            </a:lvl3pPr>
+            <a:lvl4pPr eaLnBrk="1" hangingPunct="1">
+              <a:defRPr>
+                <a:solidFill>
+                  <a:schemeClr val="tx2"/>
+                </a:solidFill>
+              </a:defRPr>
+            </a:lvl4pPr>
+            <a:lvl5pPr eaLnBrk="1" hangingPunct="1">
+              <a:defRPr>
+                <a:solidFill>
+                  <a:schemeClr val="tx2"/>
+                </a:solidFill>
+              </a:defRPr>
+            </a:lvl5pPr>
+            <a:lvl6pPr eaLnBrk="1" hangingPunct="1">
+              <a:defRPr>
+                <a:solidFill>
+                  <a:schemeClr val="tx2"/>
+                </a:solidFill>
+              </a:defRPr>
+            </a:lvl6pPr>
+            <a:lvl7pPr eaLnBrk="1" hangingPunct="1">
+              <a:defRPr>
+                <a:solidFill>
+                  <a:schemeClr val="tx2"/>
+                </a:solidFill>
+              </a:defRPr>
+            </a:lvl7pPr>
+            <a:lvl8pPr eaLnBrk="1" hangingPunct="1">
+              <a:defRPr>
+                <a:solidFill>
+                  <a:schemeClr val="tx2"/>
+                </a:solidFill>
+              </a:defRPr>
+            </a:lvl8pPr>
+            <a:lvl9pPr eaLnBrk="1" hangingPunct="1">
+              <a:defRPr>
+                <a:solidFill>
+                  <a:schemeClr val="tx2"/>
+                </a:solidFill>
+              </a:defRPr>
+            </a:lvl9pPr>
+          </a:lstStyle>
+          <a:p>
+            <a:pPr algn="ctr"/>
+            <a:r>
+              <a:rPr lang="it-IT" sz="4400" b="1" dirty="0">
+                <a:solidFill>
+                  <a:srgbClr val="FFC000"/>
+                </a:solidFill>
+              </a:rPr>
               <a:t>REFERENCES</a:t>
             </a:r>
-          </a:p>
-          <a:p>
-            <a:endParaRPr lang="it-IT" dirty="0"/>
+            <a:endParaRPr lang="en-GB" sz="4400" dirty="0"/>
           </a:p>
         </p:txBody>
       </p:sp>
@@ -14358,8 +18661,8 @@
           </a:p>
         </p:txBody>
       </p:sp>
-      <mc:AlternateContent xmlns:mc="http://schemas.openxmlformats.org/markup-compatibility/2006">
-        <mc:Choice xmlns:a14="http://schemas.microsoft.com/office/drawing/2010/main" Requires="a14">
+      <mc:AlternateContent xmlns:mc="http://schemas.openxmlformats.org/markup-compatibility/2006" xmlns:a14="http://schemas.microsoft.com/office/drawing/2010/main">
+        <mc:Choice Requires="a14">
           <p:sp>
             <p:nvSpPr>
               <p:cNvPr id="7" name="CasellaDiTesto 6"/>
@@ -14536,7 +18839,7 @@
             </p:txBody>
           </p:sp>
         </mc:Choice>
-        <mc:Fallback>
+        <mc:Fallback xmlns="">
           <p:sp>
             <p:nvSpPr>
               <p:cNvPr id="7" name="CasellaDiTesto 6"/>

</xml_diff>